<commit_message>
finished draft of quickstart section 1.4
</commit_message>
<xml_diff>
--- a/docs/source/images/images.pptx
+++ b/docs/source/images/images.pptx
@@ -294,7 +294,7 @@
           <a:p>
             <a:fld id="{85FD3787-7239-C647-8F46-4AEF603A44BF}" type="datetime1">
               <a:rPr lang="en-US" smtClean="0"/>
-              <a:t>1/17/17</a:t>
+              <a:t>1/18/17</a:t>
             </a:fld>
             <a:endParaRPr lang="en-US" dirty="0"/>
           </a:p>
@@ -464,7 +464,7 @@
           <a:p>
             <a:fld id="{58F06498-C7BA-7B4F-A289-96E741DB6F51}" type="datetime1">
               <a:rPr lang="en-US" smtClean="0"/>
-              <a:t>1/17/17</a:t>
+              <a:t>1/18/17</a:t>
             </a:fld>
             <a:endParaRPr lang="en-US" dirty="0"/>
           </a:p>
@@ -644,7 +644,7 @@
           <a:p>
             <a:fld id="{92B56630-3C53-6E41-8F36-B5B7DC677D8C}" type="datetime1">
               <a:rPr lang="en-US" smtClean="0"/>
-              <a:t>1/17/17</a:t>
+              <a:t>1/18/17</a:t>
             </a:fld>
             <a:endParaRPr lang="en-US" dirty="0"/>
           </a:p>
@@ -814,7 +814,7 @@
           <a:p>
             <a:fld id="{AB3D54BB-4E0B-844F-968F-93A99D2A0E27}" type="datetime1">
               <a:rPr lang="en-US" smtClean="0"/>
-              <a:t>1/17/17</a:t>
+              <a:t>1/18/17</a:t>
             </a:fld>
             <a:endParaRPr lang="en-US" dirty="0"/>
           </a:p>
@@ -1060,7 +1060,7 @@
           <a:p>
             <a:fld id="{8308F5C4-D4BE-1246-89B0-2CF09E5A1C73}" type="datetime1">
               <a:rPr lang="en-US" smtClean="0"/>
-              <a:t>1/17/17</a:t>
+              <a:t>1/18/17</a:t>
             </a:fld>
             <a:endParaRPr lang="en-US" dirty="0"/>
           </a:p>
@@ -1348,7 +1348,7 @@
           <a:p>
             <a:fld id="{AE2C759A-60C1-D347-A2FC-BD124BE24608}" type="datetime1">
               <a:rPr lang="en-US" smtClean="0"/>
-              <a:t>1/17/17</a:t>
+              <a:t>1/18/17</a:t>
             </a:fld>
             <a:endParaRPr lang="en-US" dirty="0"/>
           </a:p>
@@ -1770,7 +1770,7 @@
           <a:p>
             <a:fld id="{81A1B11B-E3A3-7242-9E6D-08D8E0DF02D1}" type="datetime1">
               <a:rPr lang="en-US" smtClean="0"/>
-              <a:t>1/17/17</a:t>
+              <a:t>1/18/17</a:t>
             </a:fld>
             <a:endParaRPr lang="en-US" dirty="0"/>
           </a:p>
@@ -1888,7 +1888,7 @@
           <a:p>
             <a:fld id="{4BD03965-1CEF-054A-A931-4796ABBAFB43}" type="datetime1">
               <a:rPr lang="en-US" smtClean="0"/>
-              <a:t>1/17/17</a:t>
+              <a:t>1/18/17</a:t>
             </a:fld>
             <a:endParaRPr lang="en-US" dirty="0"/>
           </a:p>
@@ -1983,7 +1983,7 @@
           <a:p>
             <a:fld id="{B2AA7C06-6D5E-494B-9BF1-9BBBE1D5A1C7}" type="datetime1">
               <a:rPr lang="en-US" smtClean="0"/>
-              <a:t>1/17/17</a:t>
+              <a:t>1/18/17</a:t>
             </a:fld>
             <a:endParaRPr lang="en-US" dirty="0"/>
           </a:p>
@@ -2260,7 +2260,7 @@
           <a:p>
             <a:fld id="{7CE04B88-50CE-7A45-AE26-A9751D882E6D}" type="datetime1">
               <a:rPr lang="en-US" smtClean="0"/>
-              <a:t>1/17/17</a:t>
+              <a:t>1/18/17</a:t>
             </a:fld>
             <a:endParaRPr lang="en-US" dirty="0"/>
           </a:p>
@@ -2517,7 +2517,7 @@
           <a:p>
             <a:fld id="{70B692A8-8BCF-2745-A1F3-24034345F60C}" type="datetime1">
               <a:rPr lang="en-US" smtClean="0"/>
-              <a:t>1/17/17</a:t>
+              <a:t>1/18/17</a:t>
             </a:fld>
             <a:endParaRPr lang="en-US" dirty="0"/>
           </a:p>
@@ -2731,7 +2731,7 @@
             <a:fld id="{B994E09A-36F1-0A45-80F7-B10DE6908129}" type="datetime1">
               <a:rPr lang="en-US" smtClean="0"/>
               <a:pPr/>
-              <a:t>1/17/17</a:t>
+              <a:t>1/18/17</a:t>
             </a:fld>
             <a:endParaRPr lang="en-US" dirty="0"/>
           </a:p>
@@ -10138,11 +10138,6 @@
                 </a:rPr>
                 <a:t>Send a text to Pat</a:t>
               </a:r>
-              <a:endParaRPr lang="en-US" sz="900" dirty="0" smtClean="0">
-                <a:solidFill>
-                  <a:srgbClr val="FFFFFF"/>
-                </a:solidFill>
-              </a:endParaRPr>
             </a:p>
             <a:p>
               <a:endParaRPr lang="en-US" sz="900" dirty="0">
@@ -11171,11 +11166,6 @@
                 </a:rPr>
                 <a:t>See you at 8pm</a:t>
               </a:r>
-              <a:endParaRPr lang="en-US" sz="900" dirty="0" smtClean="0">
-                <a:solidFill>
-                  <a:srgbClr val="FFFFFF"/>
-                </a:solidFill>
-              </a:endParaRPr>
             </a:p>
             <a:p>
               <a:endParaRPr lang="en-US" sz="900" dirty="0">
@@ -11251,11 +11241,6 @@
                 </a:rPr>
                 <a:t>Yes</a:t>
               </a:r>
-              <a:endParaRPr lang="en-US" sz="900" dirty="0" smtClean="0">
-                <a:solidFill>
-                  <a:srgbClr val="FFFFFF"/>
-                </a:solidFill>
-              </a:endParaRPr>
             </a:p>
             <a:p>
               <a:endParaRPr lang="en-US" sz="900" dirty="0">
@@ -11843,11 +11828,6 @@
                 </a:rPr>
                 <a:t>Send a text to Pat</a:t>
               </a:r>
-              <a:endParaRPr lang="en-US" sz="900" dirty="0" smtClean="0">
-                <a:solidFill>
-                  <a:srgbClr val="FFFFFF"/>
-                </a:solidFill>
-              </a:endParaRPr>
             </a:p>
             <a:p>
               <a:endParaRPr lang="en-US" sz="900" dirty="0">
@@ -12874,15 +12854,7 @@
                     <a:srgbClr val="FFFFFF"/>
                   </a:solidFill>
                 </a:rPr>
-                <a:t>Hold on a second. </a:t>
-              </a:r>
-              <a:r>
-                <a:rPr lang="en-US" sz="900" dirty="0" smtClean="0">
-                  <a:solidFill>
-                    <a:srgbClr val="FFFFFF"/>
-                  </a:solidFill>
-                </a:rPr>
-                <a:t>How do I get to</a:t>
+                <a:t>Hold on a second. How do I get to</a:t>
               </a:r>
               <a:r>
                 <a:rPr lang="en-US" sz="900" dirty="0">
@@ -12900,11 +12872,6 @@
                 </a:rPr>
                 <a:t>Enzo's restaurant?</a:t>
               </a:r>
-              <a:endParaRPr lang="en-US" sz="900" dirty="0" smtClean="0">
-                <a:solidFill>
-                  <a:srgbClr val="FFFFFF"/>
-                </a:solidFill>
-              </a:endParaRPr>
             </a:p>
             <a:p>
               <a:endParaRPr lang="en-US" sz="900" dirty="0">
@@ -13204,11 +13171,6 @@
                 </a:rPr>
                 <a:t>See you at 8pm</a:t>
               </a:r>
-              <a:endParaRPr lang="en-US" sz="900" dirty="0" smtClean="0">
-                <a:solidFill>
-                  <a:srgbClr val="FFFFFF"/>
-                </a:solidFill>
-              </a:endParaRPr>
             </a:p>
             <a:p>
               <a:endParaRPr lang="en-US" sz="900" dirty="0">
@@ -13284,11 +13246,6 @@
                 </a:rPr>
                 <a:t>Scratch that. Send a text to Sue instead</a:t>
               </a:r>
-              <a:endParaRPr lang="en-US" sz="900" dirty="0" smtClean="0">
-                <a:solidFill>
-                  <a:srgbClr val="FFFFFF"/>
-                </a:solidFill>
-              </a:endParaRPr>
             </a:p>
             <a:p>
               <a:endParaRPr lang="en-US" sz="900" dirty="0">
@@ -13364,11 +13321,6 @@
                 </a:rPr>
                 <a:t>Meet you at Enzo's</a:t>
               </a:r>
-              <a:endParaRPr lang="en-US" sz="900" dirty="0" smtClean="0">
-                <a:solidFill>
-                  <a:srgbClr val="FFFFFF"/>
-                </a:solidFill>
-              </a:endParaRPr>
             </a:p>
             <a:p>
               <a:endParaRPr lang="en-US" sz="900" dirty="0">
@@ -15440,8 +15392,16 @@
                   <a:t>{close_time} </a:t>
                 </a:r>
                 <a:r>
+                  <a:rPr lang="en-US" sz="900" dirty="0" smtClean="0">
+                    <a:solidFill>
+                      <a:srgbClr val="2C74A5"/>
+                    </a:solidFill>
+                  </a:rPr>
+                  <a:t>{date} </a:t>
+                </a:r>
+                <a:r>
                   <a:rPr lang="en-US" sz="900" dirty="0" smtClean="0"/>
-                  <a:t>tomorrow.</a:t>
+                  <a:t>.</a:t>
                 </a:r>
                 <a:endParaRPr lang="en-US" sz="900" dirty="0"/>
               </a:p>

</xml_diff>

<commit_message>
hid user manual for now
</commit_message>
<xml_diff>
--- a/docs/source/images/images.pptx
+++ b/docs/source/images/images.pptx
@@ -4575,12 +4575,8 @@
                 <a:t>23 Elm Street </a:t>
               </a:r>
               <a:r>
-                <a:rPr lang="en-US" sz="900" dirty="0" err="1"/>
-                <a:t>Kwik</a:t>
-              </a:r>
-              <a:r>
                 <a:rPr lang="en-US" sz="900" dirty="0"/>
-                <a:t>-E-Mart </a:t>
+                <a:t>Kwik-E-Mart </a:t>
               </a:r>
               <a:r>
                 <a:rPr lang="en-US" sz="900" dirty="0" smtClean="0"/>
@@ -4671,15 +4667,7 @@
             <a:p>
               <a:r>
                 <a:rPr lang="en-US" sz="900" dirty="0"/>
-                <a:t>Hello, Pat. I can help you find store hours for your local </a:t>
-              </a:r>
-              <a:r>
-                <a:rPr lang="en-US" sz="900" dirty="0" err="1"/>
-                <a:t>Kwik</a:t>
-              </a:r>
-              <a:r>
-                <a:rPr lang="en-US" sz="900" dirty="0"/>
-                <a:t>-E-Mart. How can I help?</a:t>
+                <a:t>Hello, Pat. I can help you find store hours for your local Kwik-E-Mart. How can I help?</a:t>
               </a:r>
             </a:p>
             <a:p>
@@ -4902,15 +4890,7 @@
             <a:p>
               <a:r>
                 <a:rPr lang="en-US" sz="900" dirty="0"/>
-                <a:t>Your nearest </a:t>
-              </a:r>
-              <a:r>
-                <a:rPr lang="en-US" sz="900" dirty="0" err="1"/>
-                <a:t>Kwik</a:t>
-              </a:r>
-              <a:r>
-                <a:rPr lang="en-US" sz="900" dirty="0"/>
-                <a:t>-E-Mart is located at </a:t>
+                <a:t>Your nearest Kwik-E-Mart is located at </a:t>
               </a:r>
               <a:r>
                 <a:rPr lang="en-US" sz="900" dirty="0" smtClean="0"/>
@@ -4993,23 +4973,7 @@
                     <a:srgbClr val="FFFFFF"/>
                   </a:solidFill>
                 </a:rPr>
-                <a:t>Where is the nearest </a:t>
-              </a:r>
-              <a:r>
-                <a:rPr lang="en-US" sz="900" dirty="0" err="1" smtClean="0">
-                  <a:solidFill>
-                    <a:srgbClr val="FFFFFF"/>
-                  </a:solidFill>
-                </a:rPr>
-                <a:t>Kwik</a:t>
-              </a:r>
-              <a:r>
-                <a:rPr lang="en-US" sz="900" dirty="0" smtClean="0">
-                  <a:solidFill>
-                    <a:srgbClr val="FFFFFF"/>
-                  </a:solidFill>
-                </a:rPr>
-                <a:t>-E-Mart?</a:t>
+                <a:t>Where is the nearest Kwik-E-Mart?</a:t>
               </a:r>
             </a:p>
             <a:p>
@@ -5087,12 +5051,8 @@
                 <a:t>Pine and Market </a:t>
               </a:r>
               <a:r>
-                <a:rPr lang="en-US" sz="900" dirty="0" err="1"/>
-                <a:t>Kwik</a:t>
-              </a:r>
-              <a:r>
                 <a:rPr lang="en-US" sz="900" dirty="0"/>
-                <a:t>-E-Mart opens at </a:t>
+                <a:t>Kwik-E-Mart opens at </a:t>
               </a:r>
               <a:r>
                 <a:rPr lang="en-US" sz="900" dirty="0" smtClean="0"/>
@@ -9967,20 +9927,12 @@
                   </a:rPr>
                 </a:br>
                 <a:r>
-                  <a:rPr lang="en-US" sz="900" dirty="0" err="1" smtClean="0">
-                    <a:solidFill>
-                      <a:srgbClr val="FFFFFF"/>
-                    </a:solidFill>
-                  </a:rPr>
-                  <a:t>Kwik</a:t>
-                </a:r>
-                <a:r>
                   <a:rPr lang="en-US" sz="900" dirty="0" smtClean="0">
                     <a:solidFill>
                       <a:srgbClr val="FFFFFF"/>
                     </a:solidFill>
                   </a:rPr>
-                  <a:t>-E-Mart?</a:t>
+                  <a:t>Kwik-E-Mart?</a:t>
                 </a:r>
               </a:p>
               <a:p>
@@ -16128,20 +16080,12 @@
                 </a:rPr>
               </a:br>
               <a:r>
-                <a:rPr lang="en-US" sz="900" dirty="0" err="1" smtClean="0">
-                  <a:solidFill>
-                    <a:srgbClr val="FFFFFF"/>
-                  </a:solidFill>
-                </a:rPr>
-                <a:t>Kwik</a:t>
-              </a:r>
-              <a:r>
                 <a:rPr lang="en-US" sz="900" dirty="0" smtClean="0">
                   <a:solidFill>
                     <a:srgbClr val="FFFFFF"/>
                   </a:solidFill>
                 </a:rPr>
-                <a:t>-E-Mart?</a:t>
+                <a:t>Kwik-E-Mart?</a:t>
               </a:r>
             </a:p>
             <a:p>
@@ -16552,7 +16496,7 @@
                   <a:rPr lang="en-US" sz="900" dirty="0" smtClean="0"/>
                 </a:br>
                 <a:r>
-                  <a:rPr lang="en-US" sz="900" dirty="0" err="1" smtClean="0"/>
+                  <a:rPr lang="en-US" sz="900" dirty="0" smtClean="0"/>
                   <a:t>Kwik</a:t>
                 </a:r>
                 <a:r>
@@ -16791,7 +16735,7 @@
                   <a:t>{store_name} </a:t>
                 </a:r>
                 <a:r>
-                  <a:rPr lang="en-US" sz="900" dirty="0" err="1" smtClean="0"/>
+                  <a:rPr lang="en-US" sz="900" dirty="0" smtClean="0"/>
                   <a:t>Kwik</a:t>
                 </a:r>
                 <a:r>
@@ -17039,15 +16983,7 @@
                 </a:r>
                 <a:r>
                   <a:rPr lang="en-US" sz="900" dirty="0"/>
-                  <a:t>Your nearest </a:t>
-                </a:r>
-                <a:r>
-                  <a:rPr lang="en-US" sz="900" dirty="0" err="1"/>
-                  <a:t>Kwik</a:t>
-                </a:r>
-                <a:r>
-                  <a:rPr lang="en-US" sz="900" dirty="0"/>
-                  <a:t>-E-Mart is located </a:t>
+                  <a:t>Your nearest Kwik-E-Mart is located </a:t>
                 </a:r>
                 <a:r>
                   <a:rPr lang="en-US" sz="900" dirty="0" smtClean="0"/>
@@ -18805,29 +18741,8 @@
                       <a:schemeClr val="tx1"/>
                     </a:solidFill>
                   </a:rPr>
-                  <a:t>Order  one   large      squishee    and a dozen    donuts   from the  Elm Street    </a:t>
+                  <a:t>Order  one   large      squishee    and a dozen    donuts   from the  Elm Street    Kwik-E-Mart</a:t>
                 </a:r>
-                <a:r>
-                  <a:rPr lang="en-US" sz="1200" dirty="0" err="1" smtClean="0">
-                    <a:solidFill>
-                      <a:schemeClr val="tx1"/>
-                    </a:solidFill>
-                  </a:rPr>
-                  <a:t>Kwik</a:t>
-                </a:r>
-                <a:r>
-                  <a:rPr lang="en-US" sz="1200" dirty="0" smtClean="0">
-                    <a:solidFill>
-                      <a:schemeClr val="tx1"/>
-                    </a:solidFill>
-                  </a:rPr>
-                  <a:t>-E-Mart</a:t>
-                </a:r>
-                <a:endParaRPr lang="en-US" sz="1200" dirty="0" smtClean="0">
-                  <a:solidFill>
-                    <a:schemeClr val="tx1"/>
-                  </a:solidFill>
-                </a:endParaRPr>
               </a:p>
               <a:p>
                 <a:endParaRPr lang="en-US" sz="1200" dirty="0">

</xml_diff>

<commit_message>
Draft of Question Answerer
</commit_message>
<xml_diff>
--- a/docs/source/images/images.pptx
+++ b/docs/source/images/images.pptx
@@ -16,7 +16,7 @@
     <p:sldId id="258" r:id="rId7"/>
     <p:sldId id="259" r:id="rId8"/>
     <p:sldId id="266" r:id="rId9"/>
-    <p:sldId id="260" r:id="rId10"/>
+    <p:sldId id="277" r:id="rId10"/>
     <p:sldId id="261" r:id="rId11"/>
     <p:sldId id="263" r:id="rId12"/>
     <p:sldId id="262" r:id="rId13"/>
@@ -222,7 +222,7 @@
           <a:p>
             <a:fld id="{C06C16C2-E84F-C94A-BAEB-BD9A80415D2E}" type="datetimeFigureOut">
               <a:rPr lang="en-US" smtClean="0"/>
-              <a:t>7/1/17</a:t>
+              <a:t>7/2/17</a:t>
             </a:fld>
             <a:endParaRPr lang="en-US"/>
           </a:p>
@@ -1221,7 +1221,7 @@
           <a:p>
             <a:fld id="{85FD3787-7239-C647-8F46-4AEF603A44BF}" type="datetime1">
               <a:rPr lang="en-US" smtClean="0"/>
-              <a:t>7/1/17</a:t>
+              <a:t>7/2/17</a:t>
             </a:fld>
             <a:endParaRPr lang="en-US" dirty="0"/>
           </a:p>
@@ -1391,7 +1391,7 @@
           <a:p>
             <a:fld id="{58F06498-C7BA-7B4F-A289-96E741DB6F51}" type="datetime1">
               <a:rPr lang="en-US" smtClean="0"/>
-              <a:t>7/1/17</a:t>
+              <a:t>7/2/17</a:t>
             </a:fld>
             <a:endParaRPr lang="en-US" dirty="0"/>
           </a:p>
@@ -1571,7 +1571,7 @@
           <a:p>
             <a:fld id="{92B56630-3C53-6E41-8F36-B5B7DC677D8C}" type="datetime1">
               <a:rPr lang="en-US" smtClean="0"/>
-              <a:t>7/1/17</a:t>
+              <a:t>7/2/17</a:t>
             </a:fld>
             <a:endParaRPr lang="en-US" dirty="0"/>
           </a:p>
@@ -1741,7 +1741,7 @@
           <a:p>
             <a:fld id="{AB3D54BB-4E0B-844F-968F-93A99D2A0E27}" type="datetime1">
               <a:rPr lang="en-US" smtClean="0"/>
-              <a:t>7/1/17</a:t>
+              <a:t>7/2/17</a:t>
             </a:fld>
             <a:endParaRPr lang="en-US" dirty="0"/>
           </a:p>
@@ -1987,7 +1987,7 @@
           <a:p>
             <a:fld id="{8308F5C4-D4BE-1246-89B0-2CF09E5A1C73}" type="datetime1">
               <a:rPr lang="en-US" smtClean="0"/>
-              <a:t>7/1/17</a:t>
+              <a:t>7/2/17</a:t>
             </a:fld>
             <a:endParaRPr lang="en-US" dirty="0"/>
           </a:p>
@@ -2275,7 +2275,7 @@
           <a:p>
             <a:fld id="{AE2C759A-60C1-D347-A2FC-BD124BE24608}" type="datetime1">
               <a:rPr lang="en-US" smtClean="0"/>
-              <a:t>7/1/17</a:t>
+              <a:t>7/2/17</a:t>
             </a:fld>
             <a:endParaRPr lang="en-US" dirty="0"/>
           </a:p>
@@ -2697,7 +2697,7 @@
           <a:p>
             <a:fld id="{81A1B11B-E3A3-7242-9E6D-08D8E0DF02D1}" type="datetime1">
               <a:rPr lang="en-US" smtClean="0"/>
-              <a:t>7/1/17</a:t>
+              <a:t>7/2/17</a:t>
             </a:fld>
             <a:endParaRPr lang="en-US" dirty="0"/>
           </a:p>
@@ -2815,7 +2815,7 @@
           <a:p>
             <a:fld id="{4BD03965-1CEF-054A-A931-4796ABBAFB43}" type="datetime1">
               <a:rPr lang="en-US" smtClean="0"/>
-              <a:t>7/1/17</a:t>
+              <a:t>7/2/17</a:t>
             </a:fld>
             <a:endParaRPr lang="en-US" dirty="0"/>
           </a:p>
@@ -2910,7 +2910,7 @@
           <a:p>
             <a:fld id="{B2AA7C06-6D5E-494B-9BF1-9BBBE1D5A1C7}" type="datetime1">
               <a:rPr lang="en-US" smtClean="0"/>
-              <a:t>7/1/17</a:t>
+              <a:t>7/2/17</a:t>
             </a:fld>
             <a:endParaRPr lang="en-US" dirty="0"/>
           </a:p>
@@ -3187,7 +3187,7 @@
           <a:p>
             <a:fld id="{7CE04B88-50CE-7A45-AE26-A9751D882E6D}" type="datetime1">
               <a:rPr lang="en-US" smtClean="0"/>
-              <a:t>7/1/17</a:t>
+              <a:t>7/2/17</a:t>
             </a:fld>
             <a:endParaRPr lang="en-US" dirty="0"/>
           </a:p>
@@ -3444,7 +3444,7 @@
           <a:p>
             <a:fld id="{70B692A8-8BCF-2745-A1F3-24034345F60C}" type="datetime1">
               <a:rPr lang="en-US" smtClean="0"/>
-              <a:t>7/1/17</a:t>
+              <a:t>7/2/17</a:t>
             </a:fld>
             <a:endParaRPr lang="en-US" dirty="0"/>
           </a:p>
@@ -3658,7 +3658,7 @@
             <a:fld id="{B994E09A-36F1-0A45-80F7-B10DE6908129}" type="datetime1">
               <a:rPr lang="en-US" smtClean="0"/>
               <a:pPr/>
-              <a:t>7/1/17</a:t>
+              <a:t>7/2/17</a:t>
             </a:fld>
             <a:endParaRPr lang="en-US" dirty="0"/>
           </a:p>
@@ -18110,12 +18110,6 @@
                 </a:rPr>
                 <a:t>“Order one large squishee and a dozen donuts from the Elm Street Kwik-E-Mart”</a:t>
               </a:r>
-              <a:endParaRPr lang="en-US" sz="1400" dirty="0">
-                <a:solidFill>
-                  <a:srgbClr val="2C74A5"/>
-                </a:solidFill>
-                <a:cs typeface="Arial Narrow"/>
-              </a:endParaRPr>
             </a:p>
           </p:txBody>
         </p:sp>
@@ -18158,7 +18152,6 @@
                 <a:rPr lang="en-US" b="1" dirty="0"/>
                 <a:t>INPUT</a:t>
               </a:r>
-              <a:endParaRPr lang="en-US" b="1" dirty="0"/>
             </a:p>
           </p:txBody>
         </p:sp>
@@ -18847,12 +18840,6 @@
                   </a:rPr>
                   <a:t>12</a:t>
                 </a:r>
-                <a:endParaRPr lang="en-US" sz="800" b="1" dirty="0">
-                  <a:solidFill>
-                    <a:srgbClr val="2C74A5"/>
-                  </a:solidFill>
-                  <a:cs typeface="Arial Narrow"/>
-                </a:endParaRPr>
               </a:p>
             </p:txBody>
           </p:sp>
@@ -28100,7 +28087,7 @@
         </p:nvSpPr>
         <p:spPr/>
         <p:txBody>
-          <a:bodyPr/>
+          <a:bodyPr anchor="t"/>
           <a:lstStyle/>
           <a:p>
             <a:fld id="{D01B2998-00A9-9E41-AB29-A15A35C12BAC}" type="slidenum">
@@ -28148,7 +28135,7 @@
             <p:spPr>
               <a:xfrm>
                 <a:off x="2471528" y="617329"/>
-                <a:ext cx="682417" cy="276999"/>
+                <a:ext cx="716863" cy="276999"/>
               </a:xfrm>
               <a:prstGeom prst="rect">
                 <a:avLst/>
@@ -28156,7 +28143,7 @@
               <a:noFill/>
             </p:spPr>
             <p:txBody>
-              <a:bodyPr wrap="none" rtlCol="0">
+              <a:bodyPr wrap="none" rtlCol="0" anchor="t">
                 <a:spAutoFit/>
               </a:bodyPr>
               <a:lstStyle/>
@@ -28228,7 +28215,7 @@
               </a:fontRef>
             </p:style>
             <p:txBody>
-              <a:bodyPr lIns="0" tIns="0" rIns="0" bIns="45720" rtlCol="0" anchor="ctr" anchorCtr="1"/>
+              <a:bodyPr lIns="0" tIns="0" rIns="0" bIns="45720" rtlCol="0" anchor="t" anchorCtr="1"/>
               <a:lstStyle/>
               <a:p>
                 <a:pPr algn="ctr"/>
@@ -28261,7 +28248,7 @@
             <p:spPr>
               <a:xfrm>
                 <a:off x="4200448" y="619839"/>
-                <a:ext cx="637370" cy="276999"/>
+                <a:ext cx="671979" cy="276999"/>
               </a:xfrm>
               <a:prstGeom prst="rect">
                 <a:avLst/>
@@ -28269,7 +28256,7 @@
               <a:noFill/>
             </p:spPr>
             <p:txBody>
-              <a:bodyPr wrap="none" rtlCol="0">
+              <a:bodyPr wrap="none" rtlCol="0" anchor="t">
                 <a:spAutoFit/>
               </a:bodyPr>
               <a:lstStyle/>
@@ -28341,7 +28328,7 @@
               </a:fontRef>
             </p:style>
             <p:txBody>
-              <a:bodyPr lIns="0" tIns="0" rIns="0" bIns="45720" rtlCol="0" anchor="ctr" anchorCtr="1"/>
+              <a:bodyPr lIns="0" tIns="0" rIns="0" bIns="45720" rtlCol="0" anchor="t" anchorCtr="1"/>
               <a:lstStyle/>
               <a:p>
                 <a:pPr algn="ctr"/>
@@ -28375,7 +28362,7 @@
           <p:spPr>
             <a:xfrm>
               <a:off x="2429332" y="1432863"/>
-              <a:ext cx="740344" cy="276999"/>
+              <a:ext cx="774571" cy="276999"/>
             </a:xfrm>
             <a:prstGeom prst="rect">
               <a:avLst/>
@@ -28383,7 +28370,7 @@
             <a:noFill/>
           </p:spPr>
           <p:txBody>
-            <a:bodyPr wrap="none" rtlCol="0">
+            <a:bodyPr wrap="none" rtlCol="0" anchor="t">
               <a:spAutoFit/>
             </a:bodyPr>
             <a:lstStyle/>
@@ -28455,7 +28442,7 @@
             </a:fontRef>
           </p:style>
           <p:txBody>
-            <a:bodyPr lIns="0" tIns="0" rIns="0" bIns="27432" rtlCol="0" anchor="ctr" anchorCtr="1"/>
+            <a:bodyPr lIns="0" tIns="0" rIns="0" bIns="27432" rtlCol="0" anchor="t" anchorCtr="1"/>
             <a:lstStyle/>
             <a:p>
               <a:pPr algn="ctr"/>
@@ -28606,7 +28593,7 @@
               <a:noFill/>
             </p:spPr>
             <p:txBody>
-              <a:bodyPr wrap="none" rtlCol="0">
+              <a:bodyPr wrap="none" rtlCol="0" anchor="t">
                 <a:spAutoFit/>
               </a:bodyPr>
               <a:lstStyle/>
@@ -28771,7 +28758,7 @@
               <a:noFill/>
             </p:spPr>
             <p:txBody>
-              <a:bodyPr wrap="none" rtlCol="0">
+              <a:bodyPr wrap="none" rtlCol="0" anchor="t">
                 <a:spAutoFit/>
               </a:bodyPr>
               <a:lstStyle/>
@@ -28915,7 +28902,7 @@
               <a:noFill/>
             </p:spPr>
             <p:txBody>
-              <a:bodyPr wrap="none" rtlCol="0">
+              <a:bodyPr wrap="none" rtlCol="0" anchor="t">
                 <a:spAutoFit/>
               </a:bodyPr>
               <a:lstStyle/>
@@ -29044,7 +29031,7 @@
               <a:noFill/>
             </p:spPr>
             <p:txBody>
-              <a:bodyPr wrap="none" rtlCol="0">
+              <a:bodyPr wrap="none" rtlCol="0" anchor="t">
                 <a:spAutoFit/>
               </a:bodyPr>
               <a:lstStyle/>
@@ -29173,7 +29160,7 @@
               <a:noFill/>
             </p:spPr>
             <p:txBody>
-              <a:bodyPr wrap="none" rtlCol="0">
+              <a:bodyPr wrap="none" rtlCol="0" anchor="t">
                 <a:spAutoFit/>
               </a:bodyPr>
               <a:lstStyle/>
@@ -29219,7 +29206,7 @@
             <p:spPr>
               <a:xfrm>
                 <a:off x="2471528" y="617329"/>
-                <a:ext cx="682417" cy="276999"/>
+                <a:ext cx="716863" cy="276999"/>
               </a:xfrm>
               <a:prstGeom prst="rect">
                 <a:avLst/>
@@ -29227,7 +29214,7 @@
               <a:noFill/>
             </p:spPr>
             <p:txBody>
-              <a:bodyPr wrap="none" rtlCol="0">
+              <a:bodyPr wrap="none" rtlCol="0" anchor="t">
                 <a:spAutoFit/>
               </a:bodyPr>
               <a:lstStyle/>
@@ -29299,7 +29286,7 @@
               </a:fontRef>
             </p:style>
             <p:txBody>
-              <a:bodyPr lIns="0" tIns="0" rIns="0" bIns="45720" rtlCol="0" anchor="ctr" anchorCtr="1"/>
+              <a:bodyPr lIns="0" tIns="0" rIns="0" bIns="45720" rtlCol="0" anchor="t" anchorCtr="1"/>
               <a:lstStyle/>
               <a:p>
                 <a:pPr algn="ctr"/>
@@ -29332,7 +29319,7 @@
             <p:spPr>
               <a:xfrm>
                 <a:off x="4200448" y="619839"/>
-                <a:ext cx="637370" cy="276999"/>
+                <a:ext cx="671979" cy="276999"/>
               </a:xfrm>
               <a:prstGeom prst="rect">
                 <a:avLst/>
@@ -29340,7 +29327,7 @@
               <a:noFill/>
             </p:spPr>
             <p:txBody>
-              <a:bodyPr wrap="none" rtlCol="0">
+              <a:bodyPr wrap="none" rtlCol="0" anchor="t">
                 <a:spAutoFit/>
               </a:bodyPr>
               <a:lstStyle/>
@@ -29412,7 +29399,7 @@
               </a:fontRef>
             </p:style>
             <p:txBody>
-              <a:bodyPr lIns="0" tIns="0" rIns="0" bIns="45720" rtlCol="0" anchor="ctr" anchorCtr="1"/>
+              <a:bodyPr lIns="0" tIns="0" rIns="0" bIns="45720" rtlCol="0" anchor="t" anchorCtr="1"/>
               <a:lstStyle/>
               <a:p>
                 <a:pPr algn="ctr"/>
@@ -29446,7 +29433,7 @@
           <p:spPr>
             <a:xfrm>
               <a:off x="2430298" y="1179769"/>
-              <a:ext cx="682417" cy="276999"/>
+              <a:ext cx="716863" cy="276999"/>
             </a:xfrm>
             <a:prstGeom prst="rect">
               <a:avLst/>
@@ -29454,7 +29441,7 @@
             <a:noFill/>
           </p:spPr>
           <p:txBody>
-            <a:bodyPr wrap="none" rtlCol="0">
+            <a:bodyPr wrap="none" rtlCol="0" anchor="t">
               <a:spAutoFit/>
             </a:bodyPr>
             <a:lstStyle/>
@@ -29526,7 +29513,7 @@
             </a:fontRef>
           </p:style>
           <p:txBody>
-            <a:bodyPr lIns="0" tIns="0" rIns="0" bIns="45720" rtlCol="0" anchor="ctr" anchorCtr="1"/>
+            <a:bodyPr lIns="0" tIns="0" rIns="0" bIns="45720" rtlCol="0" anchor="t" anchorCtr="1"/>
             <a:lstStyle/>
             <a:p>
               <a:pPr algn="ctr"/>
@@ -29559,7 +29546,7 @@
           <p:spPr>
             <a:xfrm>
               <a:off x="4159218" y="1182279"/>
-              <a:ext cx="637370" cy="276999"/>
+              <a:ext cx="671979" cy="276999"/>
             </a:xfrm>
             <a:prstGeom prst="rect">
               <a:avLst/>
@@ -29567,7 +29554,7 @@
             <a:noFill/>
           </p:spPr>
           <p:txBody>
-            <a:bodyPr wrap="none" rtlCol="0">
+            <a:bodyPr wrap="none" rtlCol="0" anchor="t">
               <a:spAutoFit/>
             </a:bodyPr>
             <a:lstStyle/>
@@ -29639,7 +29626,7 @@
             </a:fontRef>
           </p:style>
           <p:txBody>
-            <a:bodyPr lIns="0" tIns="0" rIns="0" bIns="45720" rtlCol="0" anchor="ctr" anchorCtr="1"/>
+            <a:bodyPr lIns="0" tIns="0" rIns="0" bIns="45720" rtlCol="0" anchor="t" anchorCtr="1"/>
             <a:lstStyle/>
             <a:p>
               <a:pPr algn="ctr"/>
@@ -29672,7 +29659,7 @@
           <p:spPr>
             <a:xfrm>
               <a:off x="5019941" y="1487303"/>
-              <a:ext cx="969264" cy="193466"/>
+              <a:ext cx="1266552" cy="193466"/>
             </a:xfrm>
             <a:prstGeom prst="roundRect">
               <a:avLst/>
@@ -29700,7 +29687,7 @@
             </a:fontRef>
           </p:style>
           <p:txBody>
-            <a:bodyPr lIns="0" tIns="0" rIns="0" bIns="27432" rtlCol="0" anchor="ctr" anchorCtr="1"/>
+            <a:bodyPr lIns="0" tIns="0" rIns="0" bIns="27432" rtlCol="0" anchor="t" anchorCtr="1"/>
             <a:lstStyle/>
             <a:p>
               <a:pPr algn="ctr"/>
@@ -29725,7 +29712,7 @@
                   <a:latin typeface="Consolas"/>
                   <a:cs typeface="Consolas"/>
                 </a:rPr>
-                <a:t>|date</a:t>
+                <a:t>|sys_time</a:t>
               </a:r>
               <a:endParaRPr lang="en-US" sz="1200" dirty="0">
                 <a:solidFill>
@@ -29760,7 +29747,7 @@
             <p:spPr>
               <a:xfrm>
                 <a:off x="2471528" y="617329"/>
-                <a:ext cx="682417" cy="276999"/>
+                <a:ext cx="716863" cy="276999"/>
               </a:xfrm>
               <a:prstGeom prst="rect">
                 <a:avLst/>
@@ -29768,7 +29755,7 @@
               <a:noFill/>
             </p:spPr>
             <p:txBody>
-              <a:bodyPr wrap="none" rtlCol="0">
+              <a:bodyPr wrap="none" rtlCol="0" anchor="t">
                 <a:spAutoFit/>
               </a:bodyPr>
               <a:lstStyle/>
@@ -29840,7 +29827,7 @@
               </a:fontRef>
             </p:style>
             <p:txBody>
-              <a:bodyPr lIns="0" tIns="0" rIns="0" bIns="45720" rtlCol="0" anchor="ctr" anchorCtr="1"/>
+              <a:bodyPr lIns="0" tIns="0" rIns="0" bIns="45720" rtlCol="0" anchor="t" anchorCtr="1"/>
               <a:lstStyle/>
               <a:p>
                 <a:pPr algn="ctr"/>
@@ -29873,7 +29860,7 @@
             <p:spPr>
               <a:xfrm>
                 <a:off x="4200448" y="619839"/>
-                <a:ext cx="637370" cy="276999"/>
+                <a:ext cx="671979" cy="276999"/>
               </a:xfrm>
               <a:prstGeom prst="rect">
                 <a:avLst/>
@@ -29881,7 +29868,7 @@
               <a:noFill/>
             </p:spPr>
             <p:txBody>
-              <a:bodyPr wrap="none" rtlCol="0">
+              <a:bodyPr wrap="none" rtlCol="0" anchor="t">
                 <a:spAutoFit/>
               </a:bodyPr>
               <a:lstStyle/>
@@ -29953,7 +29940,7 @@
               </a:fontRef>
             </p:style>
             <p:txBody>
-              <a:bodyPr lIns="0" tIns="0" rIns="0" bIns="45720" rtlCol="0" anchor="ctr" anchorCtr="1"/>
+              <a:bodyPr lIns="0" tIns="0" rIns="0" bIns="45720" rtlCol="0" anchor="t" anchorCtr="1"/>
               <a:lstStyle/>
               <a:p>
                 <a:pPr algn="ctr"/>
@@ -29987,7 +29974,7 @@
           <p:spPr>
             <a:xfrm>
               <a:off x="2427877" y="2828615"/>
-              <a:ext cx="740344" cy="276999"/>
+              <a:ext cx="774571" cy="276999"/>
             </a:xfrm>
             <a:prstGeom prst="rect">
               <a:avLst/>
@@ -29995,7 +29982,7 @@
             <a:noFill/>
           </p:spPr>
           <p:txBody>
-            <a:bodyPr wrap="none" rtlCol="0">
+            <a:bodyPr wrap="none" rtlCol="0" anchor="t">
               <a:spAutoFit/>
             </a:bodyPr>
             <a:lstStyle/>
@@ -30038,8 +30025,8 @@
           </p:nvSpPr>
           <p:spPr>
             <a:xfrm>
-              <a:off x="3116876" y="2883055"/>
-              <a:ext cx="1204409" cy="193466"/>
+              <a:off x="3116875" y="2883055"/>
+              <a:ext cx="1544799" cy="193466"/>
             </a:xfrm>
             <a:prstGeom prst="roundRect">
               <a:avLst/>
@@ -30067,12 +30054,12 @@
             </a:fontRef>
           </p:style>
           <p:txBody>
-            <a:bodyPr lIns="0" tIns="0" rIns="0" bIns="27432" rtlCol="0" anchor="ctr" anchorCtr="1"/>
+            <a:bodyPr lIns="0" tIns="0" rIns="0" bIns="27432" rtlCol="0" anchor="t" anchorCtr="1"/>
             <a:lstStyle/>
             <a:p>
               <a:pPr algn="ctr"/>
               <a:r>
-                <a:rPr lang="en-US" sz="1100" dirty="0" smtClean="0">
+                <a:rPr lang="en-US" sz="1100" smtClean="0">
                   <a:solidFill>
                     <a:schemeClr val="tx1">
                       <a:lumMod val="50000"/>
@@ -30085,14 +30072,14 @@
                 <a:t>tomorrow</a:t>
               </a:r>
               <a:r>
-                <a:rPr lang="en-US" sz="1200" dirty="0" smtClean="0">
+                <a:rPr lang="en-US" sz="1200" smtClean="0">
                   <a:solidFill>
                     <a:srgbClr val="E74C3C"/>
                   </a:solidFill>
                   <a:latin typeface="Consolas"/>
                   <a:cs typeface="Consolas"/>
                 </a:rPr>
-                <a:t>|date</a:t>
+                <a:t>|sys_time</a:t>
               </a:r>
               <a:endParaRPr lang="en-US" sz="1200" dirty="0">
                 <a:solidFill>
@@ -30113,7 +30100,7 @@
           <p:spPr>
             <a:xfrm>
               <a:off x="2428843" y="2575521"/>
-              <a:ext cx="682417" cy="276999"/>
+              <a:ext cx="716863" cy="276999"/>
             </a:xfrm>
             <a:prstGeom prst="rect">
               <a:avLst/>
@@ -30121,7 +30108,7 @@
             <a:noFill/>
           </p:spPr>
           <p:txBody>
-            <a:bodyPr wrap="none" rtlCol="0">
+            <a:bodyPr wrap="none" rtlCol="0" anchor="t">
               <a:spAutoFit/>
             </a:bodyPr>
             <a:lstStyle/>
@@ -30193,7 +30180,7 @@
             </a:fontRef>
           </p:style>
           <p:txBody>
-            <a:bodyPr lIns="0" tIns="0" rIns="0" bIns="45720" rtlCol="0" anchor="ctr" anchorCtr="1"/>
+            <a:bodyPr lIns="0" tIns="0" rIns="0" bIns="45720" rtlCol="0" anchor="t" anchorCtr="1"/>
             <a:lstStyle/>
             <a:p>
               <a:pPr algn="ctr"/>
@@ -30226,7 +30213,7 @@
           <p:spPr>
             <a:xfrm>
               <a:off x="4157763" y="2578031"/>
-              <a:ext cx="637370" cy="276999"/>
+              <a:ext cx="671979" cy="276999"/>
             </a:xfrm>
             <a:prstGeom prst="rect">
               <a:avLst/>
@@ -30234,7 +30221,7 @@
             <a:noFill/>
           </p:spPr>
           <p:txBody>
-            <a:bodyPr wrap="none" rtlCol="0">
+            <a:bodyPr wrap="none" rtlCol="0" anchor="t">
               <a:spAutoFit/>
             </a:bodyPr>
             <a:lstStyle/>
@@ -30306,7 +30293,7 @@
             </a:fontRef>
           </p:style>
           <p:txBody>
-            <a:bodyPr lIns="0" tIns="0" rIns="0" bIns="45720" rtlCol="0" anchor="ctr" anchorCtr="1"/>
+            <a:bodyPr lIns="0" tIns="0" rIns="0" bIns="45720" rtlCol="0" anchor="t" anchorCtr="1"/>
             <a:lstStyle/>
             <a:p>
               <a:pPr algn="ctr"/>
@@ -30334,7 +30321,7 @@
     </p:spTree>
     <p:extLst>
       <p:ext uri="{BB962C8B-B14F-4D97-AF65-F5344CB8AC3E}">
-        <p14:creationId xmlns:p14="http://schemas.microsoft.com/office/powerpoint/2010/main" val="2312925158"/>
+        <p14:creationId xmlns:p14="http://schemas.microsoft.com/office/powerpoint/2010/main" val="1690112468"/>
       </p:ext>
     </p:extLst>
   </p:cSld>

</xml_diff>

<commit_message>
Minor fixes to index, BP1 docs and step 6 of Quickstart
</commit_message>
<xml_diff>
--- a/docs/source/images/images.pptx
+++ b/docs/source/images/images.pptx
@@ -222,7 +222,7 @@
           <a:p>
             <a:fld id="{C06C16C2-E84F-C94A-BAEB-BD9A80415D2E}" type="datetimeFigureOut">
               <a:rPr lang="en-US" smtClean="0"/>
-              <a:t>7/2/17</a:t>
+              <a:t>7/14/17</a:t>
             </a:fld>
             <a:endParaRPr lang="en-US"/>
           </a:p>
@@ -1221,7 +1221,7 @@
           <a:p>
             <a:fld id="{85FD3787-7239-C647-8F46-4AEF603A44BF}" type="datetime1">
               <a:rPr lang="en-US" smtClean="0"/>
-              <a:t>7/2/17</a:t>
+              <a:t>7/14/17</a:t>
             </a:fld>
             <a:endParaRPr lang="en-US" dirty="0"/>
           </a:p>
@@ -1391,7 +1391,7 @@
           <a:p>
             <a:fld id="{58F06498-C7BA-7B4F-A289-96E741DB6F51}" type="datetime1">
               <a:rPr lang="en-US" smtClean="0"/>
-              <a:t>7/2/17</a:t>
+              <a:t>7/14/17</a:t>
             </a:fld>
             <a:endParaRPr lang="en-US" dirty="0"/>
           </a:p>
@@ -1571,7 +1571,7 @@
           <a:p>
             <a:fld id="{92B56630-3C53-6E41-8F36-B5B7DC677D8C}" type="datetime1">
               <a:rPr lang="en-US" smtClean="0"/>
-              <a:t>7/2/17</a:t>
+              <a:t>7/14/17</a:t>
             </a:fld>
             <a:endParaRPr lang="en-US" dirty="0"/>
           </a:p>
@@ -1741,7 +1741,7 @@
           <a:p>
             <a:fld id="{AB3D54BB-4E0B-844F-968F-93A99D2A0E27}" type="datetime1">
               <a:rPr lang="en-US" smtClean="0"/>
-              <a:t>7/2/17</a:t>
+              <a:t>7/14/17</a:t>
             </a:fld>
             <a:endParaRPr lang="en-US" dirty="0"/>
           </a:p>
@@ -1987,7 +1987,7 @@
           <a:p>
             <a:fld id="{8308F5C4-D4BE-1246-89B0-2CF09E5A1C73}" type="datetime1">
               <a:rPr lang="en-US" smtClean="0"/>
-              <a:t>7/2/17</a:t>
+              <a:t>7/14/17</a:t>
             </a:fld>
             <a:endParaRPr lang="en-US" dirty="0"/>
           </a:p>
@@ -2275,7 +2275,7 @@
           <a:p>
             <a:fld id="{AE2C759A-60C1-D347-A2FC-BD124BE24608}" type="datetime1">
               <a:rPr lang="en-US" smtClean="0"/>
-              <a:t>7/2/17</a:t>
+              <a:t>7/14/17</a:t>
             </a:fld>
             <a:endParaRPr lang="en-US" dirty="0"/>
           </a:p>
@@ -2697,7 +2697,7 @@
           <a:p>
             <a:fld id="{81A1B11B-E3A3-7242-9E6D-08D8E0DF02D1}" type="datetime1">
               <a:rPr lang="en-US" smtClean="0"/>
-              <a:t>7/2/17</a:t>
+              <a:t>7/14/17</a:t>
             </a:fld>
             <a:endParaRPr lang="en-US" dirty="0"/>
           </a:p>
@@ -2815,7 +2815,7 @@
           <a:p>
             <a:fld id="{4BD03965-1CEF-054A-A931-4796ABBAFB43}" type="datetime1">
               <a:rPr lang="en-US" smtClean="0"/>
-              <a:t>7/2/17</a:t>
+              <a:t>7/14/17</a:t>
             </a:fld>
             <a:endParaRPr lang="en-US" dirty="0"/>
           </a:p>
@@ -2910,7 +2910,7 @@
           <a:p>
             <a:fld id="{B2AA7C06-6D5E-494B-9BF1-9BBBE1D5A1C7}" type="datetime1">
               <a:rPr lang="en-US" smtClean="0"/>
-              <a:t>7/2/17</a:t>
+              <a:t>7/14/17</a:t>
             </a:fld>
             <a:endParaRPr lang="en-US" dirty="0"/>
           </a:p>
@@ -3187,7 +3187,7 @@
           <a:p>
             <a:fld id="{7CE04B88-50CE-7A45-AE26-A9751D882E6D}" type="datetime1">
               <a:rPr lang="en-US" smtClean="0"/>
-              <a:t>7/2/17</a:t>
+              <a:t>7/14/17</a:t>
             </a:fld>
             <a:endParaRPr lang="en-US" dirty="0"/>
           </a:p>
@@ -3444,7 +3444,7 @@
           <a:p>
             <a:fld id="{70B692A8-8BCF-2745-A1F3-24034345F60C}" type="datetime1">
               <a:rPr lang="en-US" smtClean="0"/>
-              <a:t>7/2/17</a:t>
+              <a:t>7/14/17</a:t>
             </a:fld>
             <a:endParaRPr lang="en-US" dirty="0"/>
           </a:p>
@@ -3658,7 +3658,7 @@
             <a:fld id="{B994E09A-36F1-0A45-80F7-B10DE6908129}" type="datetime1">
               <a:rPr lang="en-US" smtClean="0"/>
               <a:pPr/>
-              <a:t>7/2/17</a:t>
+              <a:t>7/14/17</a:t>
             </a:fld>
             <a:endParaRPr lang="en-US" dirty="0"/>
           </a:p>
@@ -26318,1726 +26318,1739 @@
           </a:p>
         </p:txBody>
       </p:sp>
-      <p:sp>
-        <p:nvSpPr>
-          <p:cNvPr id="4" name="Rectangle 3"/>
-          <p:cNvSpPr/>
+      <p:grpSp>
+        <p:nvGrpSpPr>
+          <p:cNvPr id="5" name="Group 4"/>
+          <p:cNvGrpSpPr/>
           <p:nvPr/>
-        </p:nvSpPr>
-        <p:spPr>
+        </p:nvGrpSpPr>
+        <p:grpSpPr>
           <a:xfrm>
-            <a:off x="4219141" y="1871629"/>
-            <a:ext cx="1228807" cy="267236"/>
+            <a:off x="1248023" y="1861866"/>
+            <a:ext cx="6783234" cy="2077670"/>
+            <a:chOff x="1248023" y="1861866"/>
+            <a:chExt cx="6783234" cy="2077670"/>
           </a:xfrm>
-          <a:prstGeom prst="rect">
-            <a:avLst/>
-          </a:prstGeom>
-          <a:solidFill>
-            <a:schemeClr val="bg1">
-              <a:lumMod val="95000"/>
-            </a:schemeClr>
-          </a:solidFill>
-          <a:ln w="12700" cmpd="sng">
+        </p:grpSpPr>
+        <p:sp>
+          <p:nvSpPr>
+            <p:cNvPr id="4" name="Rectangle 3"/>
+            <p:cNvSpPr/>
+            <p:nvPr/>
+          </p:nvSpPr>
+          <p:spPr>
+            <a:xfrm>
+              <a:off x="4219141" y="1871629"/>
+              <a:ext cx="1228807" cy="267236"/>
+            </a:xfrm>
+            <a:prstGeom prst="rect">
+              <a:avLst/>
+            </a:prstGeom>
             <a:solidFill>
-              <a:srgbClr val="2C74A5"/>
+              <a:schemeClr val="bg1">
+                <a:lumMod val="95000"/>
+              </a:schemeClr>
             </a:solidFill>
-          </a:ln>
-        </p:spPr>
-        <p:style>
-          <a:lnRef idx="2">
-            <a:schemeClr val="dk1"/>
-          </a:lnRef>
-          <a:fillRef idx="1">
-            <a:schemeClr val="lt1"/>
-          </a:fillRef>
-          <a:effectRef idx="0">
-            <a:schemeClr val="dk1"/>
-          </a:effectRef>
-          <a:fontRef idx="minor">
-            <a:schemeClr val="dk1"/>
-          </a:fontRef>
-        </p:style>
-        <p:txBody>
-          <a:bodyPr tIns="0" bIns="27432" rtlCol="0" anchor="ctr" anchorCtr="1"/>
-          <a:lstStyle/>
-          <a:p>
-            <a:pPr algn="ctr"/>
-            <a:r>
-              <a:rPr lang="en-US" sz="1200" b="1" dirty="0" smtClean="0">
-                <a:solidFill>
-                  <a:srgbClr val="2C74A5"/>
-                </a:solidFill>
-                <a:latin typeface="Arial Narrow"/>
-                <a:cs typeface="Arial Narrow"/>
-              </a:rPr>
-              <a:t>food_ordering</a:t>
-            </a:r>
-            <a:endParaRPr lang="en-US" sz="2000" b="1" dirty="0">
+            <a:ln w="12700" cmpd="sng">
               <a:solidFill>
                 <a:srgbClr val="2C74A5"/>
               </a:solidFill>
-              <a:latin typeface="Arial Narrow"/>
-              <a:cs typeface="Arial Narrow"/>
-            </a:endParaRPr>
-          </a:p>
-        </p:txBody>
-      </p:sp>
-      <p:sp>
-        <p:nvSpPr>
-          <p:cNvPr id="7" name="Rectangle 6"/>
-          <p:cNvSpPr/>
-          <p:nvPr/>
-        </p:nvSpPr>
-        <p:spPr>
-          <a:xfrm>
-            <a:off x="4376346" y="2505567"/>
-            <a:ext cx="914399" cy="229465"/>
-          </a:xfrm>
-          <a:prstGeom prst="rect">
-            <a:avLst/>
-          </a:prstGeom>
-          <a:solidFill>
-            <a:schemeClr val="bg1">
-              <a:lumMod val="95000"/>
-            </a:schemeClr>
-          </a:solidFill>
-          <a:ln w="12700" cmpd="sng">
-            <a:solidFill>
-              <a:srgbClr val="2C74A5"/>
-            </a:solidFill>
-          </a:ln>
-        </p:spPr>
-        <p:style>
-          <a:lnRef idx="2">
-            <a:schemeClr val="dk1"/>
-          </a:lnRef>
-          <a:fillRef idx="1">
-            <a:schemeClr val="lt1"/>
-          </a:fillRef>
-          <a:effectRef idx="0">
-            <a:schemeClr val="dk1"/>
-          </a:effectRef>
-          <a:fontRef idx="minor">
-            <a:schemeClr val="dk1"/>
-          </a:fontRef>
-        </p:style>
-        <p:txBody>
-          <a:bodyPr tIns="0" bIns="27432" rtlCol="0" anchor="ctr" anchorCtr="1"/>
-          <a:lstStyle/>
-          <a:p>
-            <a:pPr algn="ctr"/>
-            <a:r>
-              <a:rPr lang="en-US" sz="1200" b="1" dirty="0" smtClean="0">
+            </a:ln>
+          </p:spPr>
+          <p:style>
+            <a:lnRef idx="2">
+              <a:schemeClr val="dk1"/>
+            </a:lnRef>
+            <a:fillRef idx="1">
+              <a:schemeClr val="lt1"/>
+            </a:fillRef>
+            <a:effectRef idx="0">
+              <a:schemeClr val="dk1"/>
+            </a:effectRef>
+            <a:fontRef idx="minor">
+              <a:schemeClr val="dk1"/>
+            </a:fontRef>
+          </p:style>
+          <p:txBody>
+            <a:bodyPr tIns="0" bIns="27432" rtlCol="0" anchor="ctr" anchorCtr="1"/>
+            <a:lstStyle/>
+            <a:p>
+              <a:pPr algn="ctr"/>
+              <a:r>
+                <a:rPr lang="en-US" sz="1200" b="1" dirty="0" smtClean="0">
+                  <a:solidFill>
+                    <a:srgbClr val="2C74A5"/>
+                  </a:solidFill>
+                  <a:latin typeface="Arial Narrow"/>
+                  <a:cs typeface="Arial Narrow"/>
+                </a:rPr>
+                <a:t>food_ordering</a:t>
+              </a:r>
+              <a:endParaRPr lang="en-US" sz="2000" b="1" dirty="0">
                 <a:solidFill>
                   <a:srgbClr val="2C74A5"/>
                 </a:solidFill>
                 <a:latin typeface="Arial Narrow"/>
                 <a:cs typeface="Arial Narrow"/>
-              </a:rPr>
-              <a:t>ordering</a:t>
-            </a:r>
-            <a:endParaRPr lang="en-US" sz="2000" b="1" dirty="0">
+              </a:endParaRPr>
+            </a:p>
+          </p:txBody>
+        </p:sp>
+        <p:sp>
+          <p:nvSpPr>
+            <p:cNvPr id="7" name="Rectangle 6"/>
+            <p:cNvSpPr/>
+            <p:nvPr/>
+          </p:nvSpPr>
+          <p:spPr>
+            <a:xfrm>
+              <a:off x="4376346" y="2505567"/>
+              <a:ext cx="914399" cy="229465"/>
+            </a:xfrm>
+            <a:prstGeom prst="rect">
+              <a:avLst/>
+            </a:prstGeom>
+            <a:solidFill>
+              <a:schemeClr val="bg1">
+                <a:lumMod val="95000"/>
+              </a:schemeClr>
+            </a:solidFill>
+            <a:ln w="12700" cmpd="sng">
               <a:solidFill>
                 <a:srgbClr val="2C74A5"/>
               </a:solidFill>
-              <a:latin typeface="Arial Narrow"/>
-              <a:cs typeface="Arial Narrow"/>
-            </a:endParaRPr>
-          </a:p>
-        </p:txBody>
-      </p:sp>
-      <p:sp>
-        <p:nvSpPr>
-          <p:cNvPr id="60" name="TextBox 59"/>
-          <p:cNvSpPr txBox="1"/>
-          <p:nvPr/>
-        </p:nvSpPr>
-        <p:spPr>
-          <a:xfrm>
-            <a:off x="1248023" y="2487366"/>
-            <a:ext cx="808635" cy="276999"/>
-          </a:xfrm>
-          <a:prstGeom prst="rect">
-            <a:avLst/>
-          </a:prstGeom>
-          <a:noFill/>
-        </p:spPr>
-        <p:txBody>
-          <a:bodyPr wrap="none" rtlCol="0" anchor="ctr">
-            <a:spAutoFit/>
-          </a:bodyPr>
-          <a:lstStyle/>
-          <a:p>
-            <a:pPr algn="ctr"/>
-            <a:r>
-              <a:rPr lang="en-US" sz="1200" dirty="0" smtClean="0">
-                <a:solidFill>
-                  <a:srgbClr val="A6A6A6"/>
+            </a:ln>
+          </p:spPr>
+          <p:style>
+            <a:lnRef idx="2">
+              <a:schemeClr val="dk1"/>
+            </a:lnRef>
+            <a:fillRef idx="1">
+              <a:schemeClr val="lt1"/>
+            </a:fillRef>
+            <a:effectRef idx="0">
+              <a:schemeClr val="dk1"/>
+            </a:effectRef>
+            <a:fontRef idx="minor">
+              <a:schemeClr val="dk1"/>
+            </a:fontRef>
+          </p:style>
+          <p:txBody>
+            <a:bodyPr tIns="0" bIns="27432" rtlCol="0" anchor="ctr" anchorCtr="1"/>
+            <a:lstStyle/>
+            <a:p>
+              <a:pPr algn="ctr"/>
+              <a:r>
+                <a:rPr lang="en-US" sz="1200" b="1" dirty="0" smtClean="0">
+                  <a:solidFill>
+                    <a:srgbClr val="2C74A5"/>
+                  </a:solidFill>
+                  <a:latin typeface="Arial Narrow"/>
+                  <a:cs typeface="Arial Narrow"/>
+                </a:rPr>
+                <a:t>ordering</a:t>
+              </a:r>
+              <a:endParaRPr lang="en-US" sz="2000" b="1" dirty="0">
+                <a:solidFill>
+                  <a:srgbClr val="2C74A5"/>
                 </a:solidFill>
                 <a:latin typeface="Arial Narrow"/>
                 <a:cs typeface="Arial Narrow"/>
-              </a:rPr>
-              <a:t>DOMAINS:</a:t>
-            </a:r>
-          </a:p>
-        </p:txBody>
-      </p:sp>
-      <p:sp>
-        <p:nvSpPr>
-          <p:cNvPr id="61" name="TextBox 60"/>
-          <p:cNvSpPr txBox="1"/>
-          <p:nvPr/>
-        </p:nvSpPr>
-        <p:spPr>
-          <a:xfrm>
-            <a:off x="1248023" y="3074952"/>
-            <a:ext cx="759493" cy="276999"/>
-          </a:xfrm>
-          <a:prstGeom prst="rect">
-            <a:avLst/>
-          </a:prstGeom>
-          <a:noFill/>
-        </p:spPr>
-        <p:txBody>
-          <a:bodyPr wrap="none" rtlCol="0" anchor="ctr">
-            <a:spAutoFit/>
-          </a:bodyPr>
-          <a:lstStyle/>
-          <a:p>
-            <a:pPr algn="ctr"/>
-            <a:r>
-              <a:rPr lang="en-US" sz="1200" dirty="0" smtClean="0">
-                <a:solidFill>
-                  <a:srgbClr val="A6A6A6"/>
-                </a:solidFill>
-                <a:latin typeface="Arial Narrow"/>
-                <a:cs typeface="Arial Narrow"/>
-              </a:rPr>
-              <a:t>INTENTS:</a:t>
-            </a:r>
-          </a:p>
-        </p:txBody>
-      </p:sp>
-      <p:sp>
-        <p:nvSpPr>
-          <p:cNvPr id="62" name="TextBox 61"/>
-          <p:cNvSpPr txBox="1"/>
-          <p:nvPr/>
-        </p:nvSpPr>
-        <p:spPr>
-          <a:xfrm>
-            <a:off x="1248023" y="3662537"/>
-            <a:ext cx="787671" cy="276999"/>
-          </a:xfrm>
-          <a:prstGeom prst="rect">
-            <a:avLst/>
-          </a:prstGeom>
-          <a:noFill/>
-        </p:spPr>
-        <p:txBody>
-          <a:bodyPr wrap="none" rtlCol="0" anchor="ctr">
-            <a:spAutoFit/>
-          </a:bodyPr>
-          <a:lstStyle/>
-          <a:p>
-            <a:pPr algn="ctr"/>
-            <a:r>
-              <a:rPr lang="en-US" sz="1200" dirty="0" smtClean="0">
-                <a:solidFill>
-                  <a:srgbClr val="A6A6A6"/>
-                </a:solidFill>
-                <a:latin typeface="Arial Narrow"/>
-                <a:cs typeface="Arial Narrow"/>
-              </a:rPr>
-              <a:t>ENTITIES:</a:t>
-            </a:r>
-          </a:p>
-        </p:txBody>
-      </p:sp>
-      <p:sp>
-        <p:nvSpPr>
-          <p:cNvPr id="25" name="Rectangle 24"/>
-          <p:cNvSpPr/>
-          <p:nvPr/>
-        </p:nvSpPr>
-        <p:spPr>
-          <a:xfrm>
-            <a:off x="2062543" y="3112866"/>
-            <a:ext cx="683647" cy="221063"/>
-          </a:xfrm>
-          <a:prstGeom prst="rect">
-            <a:avLst/>
-          </a:prstGeom>
-          <a:solidFill>
-            <a:schemeClr val="bg1">
-              <a:lumMod val="95000"/>
-            </a:schemeClr>
-          </a:solidFill>
-          <a:ln w="12700" cmpd="sng">
+              </a:endParaRPr>
+            </a:p>
+          </p:txBody>
+        </p:sp>
+        <p:sp>
+          <p:nvSpPr>
+            <p:cNvPr id="60" name="TextBox 59"/>
+            <p:cNvSpPr txBox="1"/>
+            <p:nvPr/>
+          </p:nvSpPr>
+          <p:spPr>
+            <a:xfrm>
+              <a:off x="1248023" y="2487366"/>
+              <a:ext cx="808635" cy="276999"/>
+            </a:xfrm>
+            <a:prstGeom prst="rect">
+              <a:avLst/>
+            </a:prstGeom>
+            <a:noFill/>
+          </p:spPr>
+          <p:txBody>
+            <a:bodyPr wrap="none" rtlCol="0" anchor="ctr">
+              <a:spAutoFit/>
+            </a:bodyPr>
+            <a:lstStyle/>
+            <a:p>
+              <a:pPr algn="ctr"/>
+              <a:r>
+                <a:rPr lang="en-US" sz="1200" dirty="0" smtClean="0">
+                  <a:solidFill>
+                    <a:srgbClr val="A6A6A6"/>
+                  </a:solidFill>
+                  <a:latin typeface="Arial Narrow"/>
+                  <a:cs typeface="Arial Narrow"/>
+                </a:rPr>
+                <a:t>DOMAINS:</a:t>
+              </a:r>
+            </a:p>
+          </p:txBody>
+        </p:sp>
+        <p:sp>
+          <p:nvSpPr>
+            <p:cNvPr id="61" name="TextBox 60"/>
+            <p:cNvSpPr txBox="1"/>
+            <p:nvPr/>
+          </p:nvSpPr>
+          <p:spPr>
+            <a:xfrm>
+              <a:off x="1248023" y="3074952"/>
+              <a:ext cx="759493" cy="276999"/>
+            </a:xfrm>
+            <a:prstGeom prst="rect">
+              <a:avLst/>
+            </a:prstGeom>
+            <a:noFill/>
+          </p:spPr>
+          <p:txBody>
+            <a:bodyPr wrap="none" rtlCol="0" anchor="ctr">
+              <a:spAutoFit/>
+            </a:bodyPr>
+            <a:lstStyle/>
+            <a:p>
+              <a:pPr algn="ctr"/>
+              <a:r>
+                <a:rPr lang="en-US" sz="1200" dirty="0" smtClean="0">
+                  <a:solidFill>
+                    <a:srgbClr val="A6A6A6"/>
+                  </a:solidFill>
+                  <a:latin typeface="Arial Narrow"/>
+                  <a:cs typeface="Arial Narrow"/>
+                </a:rPr>
+                <a:t>INTENTS:</a:t>
+              </a:r>
+            </a:p>
+          </p:txBody>
+        </p:sp>
+        <p:sp>
+          <p:nvSpPr>
+            <p:cNvPr id="62" name="TextBox 61"/>
+            <p:cNvSpPr txBox="1"/>
+            <p:nvPr/>
+          </p:nvSpPr>
+          <p:spPr>
+            <a:xfrm>
+              <a:off x="1248023" y="3662537"/>
+              <a:ext cx="787671" cy="276999"/>
+            </a:xfrm>
+            <a:prstGeom prst="rect">
+              <a:avLst/>
+            </a:prstGeom>
+            <a:noFill/>
+          </p:spPr>
+          <p:txBody>
+            <a:bodyPr wrap="none" rtlCol="0" anchor="ctr">
+              <a:spAutoFit/>
+            </a:bodyPr>
+            <a:lstStyle/>
+            <a:p>
+              <a:pPr algn="ctr"/>
+              <a:r>
+                <a:rPr lang="en-US" sz="1200" dirty="0" smtClean="0">
+                  <a:solidFill>
+                    <a:srgbClr val="A6A6A6"/>
+                  </a:solidFill>
+                  <a:latin typeface="Arial Narrow"/>
+                  <a:cs typeface="Arial Narrow"/>
+                </a:rPr>
+                <a:t>ENTITIES:</a:t>
+              </a:r>
+            </a:p>
+          </p:txBody>
+        </p:sp>
+        <p:sp>
+          <p:nvSpPr>
+            <p:cNvPr id="25" name="Rectangle 24"/>
+            <p:cNvSpPr/>
+            <p:nvPr/>
+          </p:nvSpPr>
+          <p:spPr>
+            <a:xfrm>
+              <a:off x="2062543" y="3112866"/>
+              <a:ext cx="683647" cy="221063"/>
+            </a:xfrm>
+            <a:prstGeom prst="rect">
+              <a:avLst/>
+            </a:prstGeom>
             <a:solidFill>
-              <a:srgbClr val="2C74A5"/>
+              <a:schemeClr val="bg1">
+                <a:lumMod val="95000"/>
+              </a:schemeClr>
             </a:solidFill>
-          </a:ln>
-        </p:spPr>
-        <p:style>
-          <a:lnRef idx="2">
-            <a:schemeClr val="dk1"/>
-          </a:lnRef>
-          <a:fillRef idx="1">
-            <a:schemeClr val="lt1"/>
-          </a:fillRef>
-          <a:effectRef idx="0">
-            <a:schemeClr val="dk1"/>
-          </a:effectRef>
-          <a:fontRef idx="minor">
-            <a:schemeClr val="dk1"/>
-          </a:fontRef>
-        </p:style>
-        <p:txBody>
-          <a:bodyPr tIns="0" bIns="27432" rtlCol="0" anchor="ctr" anchorCtr="1"/>
-          <a:lstStyle/>
-          <a:p>
-            <a:pPr algn="ctr"/>
-            <a:r>
-              <a:rPr lang="en-US" sz="1200" b="1" dirty="0" smtClean="0">
-                <a:solidFill>
-                  <a:srgbClr val="2C74A5"/>
-                </a:solidFill>
-                <a:latin typeface="Arial Narrow"/>
-                <a:cs typeface="Arial Narrow"/>
-              </a:rPr>
-              <a:t>greet</a:t>
-            </a:r>
-            <a:endParaRPr lang="en-US" sz="2000" b="1" dirty="0">
+            <a:ln w="12700" cmpd="sng">
               <a:solidFill>
                 <a:srgbClr val="2C74A5"/>
               </a:solidFill>
-              <a:latin typeface="Arial Narrow"/>
-              <a:cs typeface="Arial Narrow"/>
-            </a:endParaRPr>
-          </a:p>
-        </p:txBody>
-      </p:sp>
-      <p:sp>
-        <p:nvSpPr>
-          <p:cNvPr id="56" name="Rectangle 55"/>
-          <p:cNvSpPr/>
-          <p:nvPr/>
-        </p:nvSpPr>
-        <p:spPr>
-          <a:xfrm>
-            <a:off x="2865248" y="3104466"/>
-            <a:ext cx="871923" cy="229465"/>
-          </a:xfrm>
-          <a:prstGeom prst="rect">
-            <a:avLst/>
-          </a:prstGeom>
-          <a:solidFill>
-            <a:schemeClr val="bg1">
-              <a:lumMod val="95000"/>
-            </a:schemeClr>
-          </a:solidFill>
-          <a:ln w="12700" cmpd="sng">
-            <a:solidFill>
-              <a:srgbClr val="2C74A5"/>
-            </a:solidFill>
-          </a:ln>
-        </p:spPr>
-        <p:style>
-          <a:lnRef idx="2">
-            <a:schemeClr val="dk1"/>
-          </a:lnRef>
-          <a:fillRef idx="1">
-            <a:schemeClr val="lt1"/>
-          </a:fillRef>
-          <a:effectRef idx="0">
-            <a:schemeClr val="dk1"/>
-          </a:effectRef>
-          <a:fontRef idx="minor">
-            <a:schemeClr val="dk1"/>
-          </a:fontRef>
-        </p:style>
-        <p:txBody>
-          <a:bodyPr tIns="0" bIns="27432" rtlCol="0" anchor="ctr" anchorCtr="1"/>
-          <a:lstStyle/>
-          <a:p>
-            <a:pPr algn="ctr"/>
-            <a:r>
-              <a:rPr lang="en-US" sz="1200" b="1" dirty="0" smtClean="0">
+            </a:ln>
+          </p:spPr>
+          <p:style>
+            <a:lnRef idx="2">
+              <a:schemeClr val="dk1"/>
+            </a:lnRef>
+            <a:fillRef idx="1">
+              <a:schemeClr val="lt1"/>
+            </a:fillRef>
+            <a:effectRef idx="0">
+              <a:schemeClr val="dk1"/>
+            </a:effectRef>
+            <a:fontRef idx="minor">
+              <a:schemeClr val="dk1"/>
+            </a:fontRef>
+          </p:style>
+          <p:txBody>
+            <a:bodyPr tIns="0" bIns="27432" rtlCol="0" anchor="ctr" anchorCtr="1"/>
+            <a:lstStyle/>
+            <a:p>
+              <a:pPr algn="ctr"/>
+              <a:r>
+                <a:rPr lang="en-US" sz="1200" b="1" dirty="0" smtClean="0">
+                  <a:solidFill>
+                    <a:srgbClr val="2C74A5"/>
+                  </a:solidFill>
+                  <a:latin typeface="Arial Narrow"/>
+                  <a:cs typeface="Arial Narrow"/>
+                </a:rPr>
+                <a:t>greet</a:t>
+              </a:r>
+              <a:endParaRPr lang="en-US" sz="2000" b="1" dirty="0">
                 <a:solidFill>
                   <a:srgbClr val="2C74A5"/>
                 </a:solidFill>
                 <a:latin typeface="Arial Narrow"/>
                 <a:cs typeface="Arial Narrow"/>
-              </a:rPr>
-              <a:t>build_order</a:t>
-            </a:r>
-            <a:endParaRPr lang="en-US" sz="2000" b="1" dirty="0">
+              </a:endParaRPr>
+            </a:p>
+          </p:txBody>
+        </p:sp>
+        <p:sp>
+          <p:nvSpPr>
+            <p:cNvPr id="56" name="Rectangle 55"/>
+            <p:cNvSpPr/>
+            <p:nvPr/>
+          </p:nvSpPr>
+          <p:spPr>
+            <a:xfrm>
+              <a:off x="2865248" y="3104466"/>
+              <a:ext cx="871923" cy="229465"/>
+            </a:xfrm>
+            <a:prstGeom prst="rect">
+              <a:avLst/>
+            </a:prstGeom>
+            <a:solidFill>
+              <a:schemeClr val="bg1">
+                <a:lumMod val="95000"/>
+              </a:schemeClr>
+            </a:solidFill>
+            <a:ln w="12700" cmpd="sng">
               <a:solidFill>
                 <a:srgbClr val="2C74A5"/>
               </a:solidFill>
-              <a:latin typeface="Arial Narrow"/>
-              <a:cs typeface="Arial Narrow"/>
-            </a:endParaRPr>
-          </a:p>
-        </p:txBody>
-      </p:sp>
-      <p:sp>
-        <p:nvSpPr>
-          <p:cNvPr id="64" name="Rectangle 63"/>
-          <p:cNvSpPr/>
-          <p:nvPr/>
-        </p:nvSpPr>
-        <p:spPr>
-          <a:xfrm>
-            <a:off x="3855673" y="3104467"/>
-            <a:ext cx="914399" cy="229465"/>
-          </a:xfrm>
-          <a:prstGeom prst="rect">
-            <a:avLst/>
-          </a:prstGeom>
-          <a:solidFill>
-            <a:schemeClr val="bg1">
-              <a:lumMod val="95000"/>
-            </a:schemeClr>
-          </a:solidFill>
-          <a:ln w="12700" cmpd="sng">
-            <a:solidFill>
-              <a:srgbClr val="2C74A5"/>
-            </a:solidFill>
-          </a:ln>
-        </p:spPr>
-        <p:style>
-          <a:lnRef idx="2">
-            <a:schemeClr val="dk1"/>
-          </a:lnRef>
-          <a:fillRef idx="1">
-            <a:schemeClr val="lt1"/>
-          </a:fillRef>
-          <a:effectRef idx="0">
-            <a:schemeClr val="dk1"/>
-          </a:effectRef>
-          <a:fontRef idx="minor">
-            <a:schemeClr val="dk1"/>
-          </a:fontRef>
-        </p:style>
-        <p:txBody>
-          <a:bodyPr tIns="0" bIns="27432" rtlCol="0" anchor="ctr" anchorCtr="1"/>
-          <a:lstStyle/>
-          <a:p>
-            <a:pPr algn="ctr"/>
-            <a:r>
-              <a:rPr lang="en-US" sz="1200" b="1" dirty="0" smtClean="0">
+            </a:ln>
+          </p:spPr>
+          <p:style>
+            <a:lnRef idx="2">
+              <a:schemeClr val="dk1"/>
+            </a:lnRef>
+            <a:fillRef idx="1">
+              <a:schemeClr val="lt1"/>
+            </a:fillRef>
+            <a:effectRef idx="0">
+              <a:schemeClr val="dk1"/>
+            </a:effectRef>
+            <a:fontRef idx="minor">
+              <a:schemeClr val="dk1"/>
+            </a:fontRef>
+          </p:style>
+          <p:txBody>
+            <a:bodyPr tIns="0" bIns="27432" rtlCol="0" anchor="ctr" anchorCtr="1"/>
+            <a:lstStyle/>
+            <a:p>
+              <a:pPr algn="ctr"/>
+              <a:r>
+                <a:rPr lang="en-US" sz="1200" b="1" dirty="0" smtClean="0">
+                  <a:solidFill>
+                    <a:srgbClr val="2C74A5"/>
+                  </a:solidFill>
+                  <a:latin typeface="Arial Narrow"/>
+                  <a:cs typeface="Arial Narrow"/>
+                </a:rPr>
+                <a:t>build_order</a:t>
+              </a:r>
+              <a:endParaRPr lang="en-US" sz="2000" b="1" dirty="0">
                 <a:solidFill>
                   <a:srgbClr val="2C74A5"/>
                 </a:solidFill>
                 <a:latin typeface="Arial Narrow"/>
                 <a:cs typeface="Arial Narrow"/>
-              </a:rPr>
-              <a:t>place_order</a:t>
-            </a:r>
-            <a:endParaRPr lang="en-US" sz="2000" b="1" dirty="0">
+              </a:endParaRPr>
+            </a:p>
+          </p:txBody>
+        </p:sp>
+        <p:sp>
+          <p:nvSpPr>
+            <p:cNvPr id="64" name="Rectangle 63"/>
+            <p:cNvSpPr/>
+            <p:nvPr/>
+          </p:nvSpPr>
+          <p:spPr>
+            <a:xfrm>
+              <a:off x="3855673" y="3104467"/>
+              <a:ext cx="914399" cy="229465"/>
+            </a:xfrm>
+            <a:prstGeom prst="rect">
+              <a:avLst/>
+            </a:prstGeom>
+            <a:solidFill>
+              <a:schemeClr val="bg1">
+                <a:lumMod val="95000"/>
+              </a:schemeClr>
+            </a:solidFill>
+            <a:ln w="12700" cmpd="sng">
               <a:solidFill>
                 <a:srgbClr val="2C74A5"/>
               </a:solidFill>
-              <a:latin typeface="Arial Narrow"/>
-              <a:cs typeface="Arial Narrow"/>
-            </a:endParaRPr>
-          </a:p>
-        </p:txBody>
-      </p:sp>
-      <p:sp>
-        <p:nvSpPr>
-          <p:cNvPr id="66" name="Rectangle 65"/>
-          <p:cNvSpPr/>
-          <p:nvPr/>
-        </p:nvSpPr>
-        <p:spPr>
-          <a:xfrm>
-            <a:off x="5837454" y="3096234"/>
-            <a:ext cx="543371" cy="229465"/>
-          </a:xfrm>
-          <a:prstGeom prst="rect">
-            <a:avLst/>
-          </a:prstGeom>
-          <a:solidFill>
-            <a:schemeClr val="bg1">
-              <a:lumMod val="95000"/>
-            </a:schemeClr>
-          </a:solidFill>
-          <a:ln w="12700" cmpd="sng">
-            <a:solidFill>
-              <a:srgbClr val="2C74A5"/>
-            </a:solidFill>
-          </a:ln>
-        </p:spPr>
-        <p:style>
-          <a:lnRef idx="2">
-            <a:schemeClr val="dk1"/>
-          </a:lnRef>
-          <a:fillRef idx="1">
-            <a:schemeClr val="lt1"/>
-          </a:fillRef>
-          <a:effectRef idx="0">
-            <a:schemeClr val="dk1"/>
-          </a:effectRef>
-          <a:fontRef idx="minor">
-            <a:schemeClr val="dk1"/>
-          </a:fontRef>
-        </p:style>
-        <p:txBody>
-          <a:bodyPr tIns="0" bIns="27432" rtlCol="0" anchor="ctr" anchorCtr="1"/>
-          <a:lstStyle/>
-          <a:p>
-            <a:pPr algn="ctr"/>
-            <a:r>
-              <a:rPr lang="en-US" sz="1200" b="1" dirty="0" smtClean="0">
+            </a:ln>
+          </p:spPr>
+          <p:style>
+            <a:lnRef idx="2">
+              <a:schemeClr val="dk1"/>
+            </a:lnRef>
+            <a:fillRef idx="1">
+              <a:schemeClr val="lt1"/>
+            </a:fillRef>
+            <a:effectRef idx="0">
+              <a:schemeClr val="dk1"/>
+            </a:effectRef>
+            <a:fontRef idx="minor">
+              <a:schemeClr val="dk1"/>
+            </a:fontRef>
+          </p:style>
+          <p:txBody>
+            <a:bodyPr tIns="0" bIns="27432" rtlCol="0" anchor="ctr" anchorCtr="1"/>
+            <a:lstStyle/>
+            <a:p>
+              <a:pPr algn="ctr"/>
+              <a:r>
+                <a:rPr lang="en-US" sz="1200" b="1" dirty="0" smtClean="0">
+                  <a:solidFill>
+                    <a:srgbClr val="2C74A5"/>
+                  </a:solidFill>
+                  <a:latin typeface="Arial Narrow"/>
+                  <a:cs typeface="Arial Narrow"/>
+                </a:rPr>
+                <a:t>place_order</a:t>
+              </a:r>
+              <a:endParaRPr lang="en-US" sz="2000" b="1" dirty="0">
                 <a:solidFill>
                   <a:srgbClr val="2C74A5"/>
                 </a:solidFill>
                 <a:latin typeface="Arial Narrow"/>
                 <a:cs typeface="Arial Narrow"/>
-              </a:rPr>
-              <a:t>exit</a:t>
-            </a:r>
-            <a:endParaRPr lang="en-US" sz="2000" b="1" dirty="0">
+              </a:endParaRPr>
+            </a:p>
+          </p:txBody>
+        </p:sp>
+        <p:sp>
+          <p:nvSpPr>
+            <p:cNvPr id="66" name="Rectangle 65"/>
+            <p:cNvSpPr/>
+            <p:nvPr/>
+          </p:nvSpPr>
+          <p:spPr>
+            <a:xfrm>
+              <a:off x="5837454" y="3096234"/>
+              <a:ext cx="543371" cy="229465"/>
+            </a:xfrm>
+            <a:prstGeom prst="rect">
+              <a:avLst/>
+            </a:prstGeom>
+            <a:solidFill>
+              <a:schemeClr val="bg1">
+                <a:lumMod val="95000"/>
+              </a:schemeClr>
+            </a:solidFill>
+            <a:ln w="12700" cmpd="sng">
               <a:solidFill>
                 <a:srgbClr val="2C74A5"/>
               </a:solidFill>
-              <a:latin typeface="Arial Narrow"/>
-              <a:cs typeface="Arial Narrow"/>
-            </a:endParaRPr>
-          </a:p>
-        </p:txBody>
-      </p:sp>
-      <p:sp>
-        <p:nvSpPr>
-          <p:cNvPr id="67" name="Rectangle 66"/>
-          <p:cNvSpPr/>
-          <p:nvPr/>
-        </p:nvSpPr>
-        <p:spPr>
-          <a:xfrm>
-            <a:off x="6499327" y="3096233"/>
-            <a:ext cx="455500" cy="229465"/>
-          </a:xfrm>
-          <a:prstGeom prst="rect">
-            <a:avLst/>
-          </a:prstGeom>
-          <a:solidFill>
-            <a:schemeClr val="bg1">
-              <a:lumMod val="95000"/>
-            </a:schemeClr>
-          </a:solidFill>
-          <a:ln w="12700" cmpd="sng">
-            <a:solidFill>
-              <a:srgbClr val="2C74A5"/>
-            </a:solidFill>
-          </a:ln>
-        </p:spPr>
-        <p:style>
-          <a:lnRef idx="2">
-            <a:schemeClr val="dk1"/>
-          </a:lnRef>
-          <a:fillRef idx="1">
-            <a:schemeClr val="lt1"/>
-          </a:fillRef>
-          <a:effectRef idx="0">
-            <a:schemeClr val="dk1"/>
-          </a:effectRef>
-          <a:fontRef idx="minor">
-            <a:schemeClr val="dk1"/>
-          </a:fontRef>
-        </p:style>
-        <p:txBody>
-          <a:bodyPr tIns="0" bIns="27432" rtlCol="0" anchor="ctr" anchorCtr="1"/>
-          <a:lstStyle/>
-          <a:p>
-            <a:pPr algn="ctr"/>
-            <a:r>
-              <a:rPr lang="en-US" sz="1200" b="1" dirty="0" smtClean="0">
+            </a:ln>
+          </p:spPr>
+          <p:style>
+            <a:lnRef idx="2">
+              <a:schemeClr val="dk1"/>
+            </a:lnRef>
+            <a:fillRef idx="1">
+              <a:schemeClr val="lt1"/>
+            </a:fillRef>
+            <a:effectRef idx="0">
+              <a:schemeClr val="dk1"/>
+            </a:effectRef>
+            <a:fontRef idx="minor">
+              <a:schemeClr val="dk1"/>
+            </a:fontRef>
+          </p:style>
+          <p:txBody>
+            <a:bodyPr tIns="0" bIns="27432" rtlCol="0" anchor="ctr" anchorCtr="1"/>
+            <a:lstStyle/>
+            <a:p>
+              <a:pPr algn="ctr"/>
+              <a:r>
+                <a:rPr lang="en-US" sz="1200" b="1" dirty="0" smtClean="0">
+                  <a:solidFill>
+                    <a:srgbClr val="2C74A5"/>
+                  </a:solidFill>
+                  <a:latin typeface="Arial Narrow"/>
+                  <a:cs typeface="Arial Narrow"/>
+                </a:rPr>
+                <a:t>exit</a:t>
+              </a:r>
+              <a:endParaRPr lang="en-US" sz="2000" b="1" dirty="0">
                 <a:solidFill>
                   <a:srgbClr val="2C74A5"/>
                 </a:solidFill>
                 <a:latin typeface="Arial Narrow"/>
                 <a:cs typeface="Arial Narrow"/>
-              </a:rPr>
-              <a:t>help</a:t>
-            </a:r>
-            <a:endParaRPr lang="en-US" sz="2000" b="1" dirty="0">
+              </a:endParaRPr>
+            </a:p>
+          </p:txBody>
+        </p:sp>
+        <p:sp>
+          <p:nvSpPr>
+            <p:cNvPr id="67" name="Rectangle 66"/>
+            <p:cNvSpPr/>
+            <p:nvPr/>
+          </p:nvSpPr>
+          <p:spPr>
+            <a:xfrm>
+              <a:off x="6499327" y="3096233"/>
+              <a:ext cx="455500" cy="229465"/>
+            </a:xfrm>
+            <a:prstGeom prst="rect">
+              <a:avLst/>
+            </a:prstGeom>
+            <a:solidFill>
+              <a:schemeClr val="bg1">
+                <a:lumMod val="95000"/>
+              </a:schemeClr>
+            </a:solidFill>
+            <a:ln w="12700" cmpd="sng">
               <a:solidFill>
                 <a:srgbClr val="2C74A5"/>
               </a:solidFill>
-              <a:latin typeface="Arial Narrow"/>
-              <a:cs typeface="Arial Narrow"/>
-            </a:endParaRPr>
-          </a:p>
-        </p:txBody>
-      </p:sp>
-      <p:sp>
-        <p:nvSpPr>
-          <p:cNvPr id="35" name="Rectangle 34"/>
-          <p:cNvSpPr/>
-          <p:nvPr/>
-        </p:nvSpPr>
-        <p:spPr>
-          <a:xfrm>
-            <a:off x="4888574" y="3097061"/>
-            <a:ext cx="830378" cy="229465"/>
-          </a:xfrm>
-          <a:prstGeom prst="rect">
-            <a:avLst/>
-          </a:prstGeom>
-          <a:solidFill>
-            <a:schemeClr val="bg1">
-              <a:lumMod val="95000"/>
-            </a:schemeClr>
-          </a:solidFill>
-          <a:ln w="12700" cmpd="sng">
-            <a:solidFill>
-              <a:srgbClr val="2C74A5"/>
-            </a:solidFill>
-          </a:ln>
-        </p:spPr>
-        <p:style>
-          <a:lnRef idx="2">
-            <a:schemeClr val="dk1"/>
-          </a:lnRef>
-          <a:fillRef idx="1">
-            <a:schemeClr val="lt1"/>
-          </a:fillRef>
-          <a:effectRef idx="0">
-            <a:schemeClr val="dk1"/>
-          </a:effectRef>
-          <a:fontRef idx="minor">
-            <a:schemeClr val="dk1"/>
-          </a:fontRef>
-        </p:style>
-        <p:txBody>
-          <a:bodyPr tIns="0" bIns="27432" rtlCol="0" anchor="ctr" anchorCtr="1"/>
-          <a:lstStyle/>
-          <a:p>
-            <a:pPr algn="ctr"/>
-            <a:r>
-              <a:rPr lang="en-US" sz="1200" b="1" smtClean="0">
+            </a:ln>
+          </p:spPr>
+          <p:style>
+            <a:lnRef idx="2">
+              <a:schemeClr val="dk1"/>
+            </a:lnRef>
+            <a:fillRef idx="1">
+              <a:schemeClr val="lt1"/>
+            </a:fillRef>
+            <a:effectRef idx="0">
+              <a:schemeClr val="dk1"/>
+            </a:effectRef>
+            <a:fontRef idx="minor">
+              <a:schemeClr val="dk1"/>
+            </a:fontRef>
+          </p:style>
+          <p:txBody>
+            <a:bodyPr tIns="0" bIns="27432" rtlCol="0" anchor="ctr" anchorCtr="1"/>
+            <a:lstStyle/>
+            <a:p>
+              <a:pPr algn="ctr"/>
+              <a:r>
+                <a:rPr lang="en-US" sz="1200" b="1" dirty="0" smtClean="0">
+                  <a:solidFill>
+                    <a:srgbClr val="2C74A5"/>
+                  </a:solidFill>
+                  <a:latin typeface="Arial Narrow"/>
+                  <a:cs typeface="Arial Narrow"/>
+                </a:rPr>
+                <a:t>help</a:t>
+              </a:r>
+              <a:endParaRPr lang="en-US" sz="2000" b="1" dirty="0">
                 <a:solidFill>
                   <a:srgbClr val="2C74A5"/>
                 </a:solidFill>
                 <a:latin typeface="Arial Narrow"/>
                 <a:cs typeface="Arial Narrow"/>
-              </a:rPr>
-              <a:t>start_over</a:t>
-            </a:r>
-            <a:endParaRPr lang="en-US" sz="2000" b="1" dirty="0">
+              </a:endParaRPr>
+            </a:p>
+          </p:txBody>
+        </p:sp>
+        <p:sp>
+          <p:nvSpPr>
+            <p:cNvPr id="35" name="Rectangle 34"/>
+            <p:cNvSpPr/>
+            <p:nvPr/>
+          </p:nvSpPr>
+          <p:spPr>
+            <a:xfrm>
+              <a:off x="4888574" y="3097061"/>
+              <a:ext cx="830378" cy="229465"/>
+            </a:xfrm>
+            <a:prstGeom prst="rect">
+              <a:avLst/>
+            </a:prstGeom>
+            <a:solidFill>
+              <a:schemeClr val="bg1">
+                <a:lumMod val="95000"/>
+              </a:schemeClr>
+            </a:solidFill>
+            <a:ln w="12700" cmpd="sng">
               <a:solidFill>
                 <a:srgbClr val="2C74A5"/>
               </a:solidFill>
-              <a:latin typeface="Arial Narrow"/>
-              <a:cs typeface="Arial Narrow"/>
-            </a:endParaRPr>
-          </a:p>
-        </p:txBody>
-      </p:sp>
-      <p:sp>
-        <p:nvSpPr>
-          <p:cNvPr id="36" name="Rectangle 35"/>
-          <p:cNvSpPr/>
-          <p:nvPr/>
-        </p:nvSpPr>
-        <p:spPr>
-          <a:xfrm>
-            <a:off x="7077704" y="3096233"/>
-            <a:ext cx="953553" cy="229465"/>
-          </a:xfrm>
-          <a:prstGeom prst="rect">
-            <a:avLst/>
-          </a:prstGeom>
-          <a:solidFill>
-            <a:schemeClr val="bg1">
-              <a:lumMod val="95000"/>
-            </a:schemeClr>
-          </a:solidFill>
-          <a:ln w="12700" cmpd="sng">
-            <a:solidFill>
-              <a:srgbClr val="2C74A5"/>
-            </a:solidFill>
-          </a:ln>
-        </p:spPr>
-        <p:style>
-          <a:lnRef idx="2">
-            <a:schemeClr val="dk1"/>
-          </a:lnRef>
-          <a:fillRef idx="1">
-            <a:schemeClr val="lt1"/>
-          </a:fillRef>
-          <a:effectRef idx="0">
-            <a:schemeClr val="dk1"/>
-          </a:effectRef>
-          <a:fontRef idx="minor">
-            <a:schemeClr val="dk1"/>
-          </a:fontRef>
-        </p:style>
-        <p:txBody>
-          <a:bodyPr tIns="0" bIns="27432" rtlCol="0" anchor="ctr" anchorCtr="1"/>
-          <a:lstStyle/>
-          <a:p>
-            <a:pPr algn="ctr"/>
-            <a:r>
-              <a:rPr lang="en-US" sz="1200" b="1" dirty="0" smtClean="0">
+            </a:ln>
+          </p:spPr>
+          <p:style>
+            <a:lnRef idx="2">
+              <a:schemeClr val="dk1"/>
+            </a:lnRef>
+            <a:fillRef idx="1">
+              <a:schemeClr val="lt1"/>
+            </a:fillRef>
+            <a:effectRef idx="0">
+              <a:schemeClr val="dk1"/>
+            </a:effectRef>
+            <a:fontRef idx="minor">
+              <a:schemeClr val="dk1"/>
+            </a:fontRef>
+          </p:style>
+          <p:txBody>
+            <a:bodyPr tIns="0" bIns="27432" rtlCol="0" anchor="ctr" anchorCtr="1"/>
+            <a:lstStyle/>
+            <a:p>
+              <a:pPr algn="ctr"/>
+              <a:r>
+                <a:rPr lang="en-US" sz="1200" b="1" smtClean="0">
+                  <a:solidFill>
+                    <a:srgbClr val="2C74A5"/>
+                  </a:solidFill>
+                  <a:latin typeface="Arial Narrow"/>
+                  <a:cs typeface="Arial Narrow"/>
+                </a:rPr>
+                <a:t>start_over</a:t>
+              </a:r>
+              <a:endParaRPr lang="en-US" sz="2000" b="1" dirty="0">
                 <a:solidFill>
                   <a:srgbClr val="2C74A5"/>
                 </a:solidFill>
                 <a:latin typeface="Arial Narrow"/>
                 <a:cs typeface="Arial Narrow"/>
-              </a:rPr>
-              <a:t>unsupported</a:t>
-            </a:r>
-            <a:endParaRPr lang="en-US" sz="2000" b="1" dirty="0">
+              </a:endParaRPr>
+            </a:p>
+          </p:txBody>
+        </p:sp>
+        <p:sp>
+          <p:nvSpPr>
+            <p:cNvPr id="36" name="Rectangle 35"/>
+            <p:cNvSpPr/>
+            <p:nvPr/>
+          </p:nvSpPr>
+          <p:spPr>
+            <a:xfrm>
+              <a:off x="7077704" y="3096233"/>
+              <a:ext cx="953553" cy="229465"/>
+            </a:xfrm>
+            <a:prstGeom prst="rect">
+              <a:avLst/>
+            </a:prstGeom>
+            <a:solidFill>
+              <a:schemeClr val="bg1">
+                <a:lumMod val="95000"/>
+              </a:schemeClr>
+            </a:solidFill>
+            <a:ln w="12700" cmpd="sng">
               <a:solidFill>
                 <a:srgbClr val="2C74A5"/>
               </a:solidFill>
-              <a:latin typeface="Arial Narrow"/>
-              <a:cs typeface="Arial Narrow"/>
-            </a:endParaRPr>
-          </a:p>
-        </p:txBody>
-      </p:sp>
-      <p:sp>
-        <p:nvSpPr>
-          <p:cNvPr id="69" name="Rectangle 68"/>
-          <p:cNvSpPr/>
-          <p:nvPr/>
-        </p:nvSpPr>
-        <p:spPr>
-          <a:xfrm>
-            <a:off x="2234436" y="3688558"/>
-            <a:ext cx="809524" cy="229465"/>
-          </a:xfrm>
-          <a:prstGeom prst="rect">
-            <a:avLst/>
-          </a:prstGeom>
-          <a:solidFill>
-            <a:schemeClr val="bg1">
-              <a:lumMod val="95000"/>
-            </a:schemeClr>
-          </a:solidFill>
-          <a:ln w="12700" cmpd="sng">
-            <a:solidFill>
-              <a:srgbClr val="2C74A5"/>
-            </a:solidFill>
-          </a:ln>
-        </p:spPr>
-        <p:style>
-          <a:lnRef idx="2">
-            <a:schemeClr val="dk1"/>
-          </a:lnRef>
-          <a:fillRef idx="1">
-            <a:schemeClr val="lt1"/>
-          </a:fillRef>
-          <a:effectRef idx="0">
-            <a:schemeClr val="dk1"/>
-          </a:effectRef>
-          <a:fontRef idx="minor">
-            <a:schemeClr val="dk1"/>
-          </a:fontRef>
-        </p:style>
-        <p:txBody>
-          <a:bodyPr tIns="0" bIns="27432" rtlCol="0" anchor="ctr" anchorCtr="1"/>
-          <a:lstStyle/>
-          <a:p>
-            <a:pPr algn="ctr"/>
-            <a:r>
-              <a:rPr lang="en-US" sz="1200" b="1" dirty="0" smtClean="0">
+            </a:ln>
+          </p:spPr>
+          <p:style>
+            <a:lnRef idx="2">
+              <a:schemeClr val="dk1"/>
+            </a:lnRef>
+            <a:fillRef idx="1">
+              <a:schemeClr val="lt1"/>
+            </a:fillRef>
+            <a:effectRef idx="0">
+              <a:schemeClr val="dk1"/>
+            </a:effectRef>
+            <a:fontRef idx="minor">
+              <a:schemeClr val="dk1"/>
+            </a:fontRef>
+          </p:style>
+          <p:txBody>
+            <a:bodyPr tIns="0" bIns="27432" rtlCol="0" anchor="ctr" anchorCtr="1"/>
+            <a:lstStyle/>
+            <a:p>
+              <a:pPr algn="ctr"/>
+              <a:r>
+                <a:rPr lang="en-US" sz="1200" b="1" dirty="0" smtClean="0">
+                  <a:solidFill>
+                    <a:srgbClr val="2C74A5"/>
+                  </a:solidFill>
+                  <a:latin typeface="Arial Narrow"/>
+                  <a:cs typeface="Arial Narrow"/>
+                </a:rPr>
+                <a:t>unsupported</a:t>
+              </a:r>
+              <a:endParaRPr lang="en-US" sz="2000" b="1" dirty="0">
                 <a:solidFill>
                   <a:srgbClr val="2C74A5"/>
                 </a:solidFill>
                 <a:latin typeface="Arial Narrow"/>
                 <a:cs typeface="Arial Narrow"/>
-              </a:rPr>
-              <a:t>restaurant</a:t>
-            </a:r>
-            <a:endParaRPr lang="en-US" sz="2000" b="1" dirty="0">
+              </a:endParaRPr>
+            </a:p>
+          </p:txBody>
+        </p:sp>
+        <p:sp>
+          <p:nvSpPr>
+            <p:cNvPr id="69" name="Rectangle 68"/>
+            <p:cNvSpPr/>
+            <p:nvPr/>
+          </p:nvSpPr>
+          <p:spPr>
+            <a:xfrm>
+              <a:off x="2234436" y="3688558"/>
+              <a:ext cx="809524" cy="229465"/>
+            </a:xfrm>
+            <a:prstGeom prst="rect">
+              <a:avLst/>
+            </a:prstGeom>
+            <a:solidFill>
+              <a:schemeClr val="bg1">
+                <a:lumMod val="95000"/>
+              </a:schemeClr>
+            </a:solidFill>
+            <a:ln w="12700" cmpd="sng">
               <a:solidFill>
                 <a:srgbClr val="2C74A5"/>
               </a:solidFill>
-              <a:latin typeface="Arial Narrow"/>
-              <a:cs typeface="Arial Narrow"/>
-            </a:endParaRPr>
-          </a:p>
-        </p:txBody>
-      </p:sp>
-      <p:sp>
-        <p:nvSpPr>
-          <p:cNvPr id="70" name="Rectangle 69"/>
-          <p:cNvSpPr/>
-          <p:nvPr/>
-        </p:nvSpPr>
-        <p:spPr>
-          <a:xfrm>
-            <a:off x="4697115" y="3686043"/>
-            <a:ext cx="498332" cy="229465"/>
-          </a:xfrm>
-          <a:prstGeom prst="rect">
-            <a:avLst/>
-          </a:prstGeom>
-          <a:solidFill>
-            <a:schemeClr val="bg1">
-              <a:lumMod val="95000"/>
-            </a:schemeClr>
-          </a:solidFill>
-          <a:ln w="12700" cmpd="sng">
-            <a:solidFill>
-              <a:srgbClr val="2C74A5"/>
-            </a:solidFill>
-          </a:ln>
-        </p:spPr>
-        <p:style>
-          <a:lnRef idx="2">
-            <a:schemeClr val="dk1"/>
-          </a:lnRef>
-          <a:fillRef idx="1">
-            <a:schemeClr val="lt1"/>
-          </a:fillRef>
-          <a:effectRef idx="0">
-            <a:schemeClr val="dk1"/>
-          </a:effectRef>
-          <a:fontRef idx="minor">
-            <a:schemeClr val="dk1"/>
-          </a:fontRef>
-        </p:style>
-        <p:txBody>
-          <a:bodyPr tIns="0" bIns="27432" rtlCol="0" anchor="ctr" anchorCtr="1"/>
-          <a:lstStyle/>
-          <a:p>
-            <a:pPr algn="ctr"/>
-            <a:r>
-              <a:rPr lang="en-US" sz="1200" b="1" dirty="0" smtClean="0">
+            </a:ln>
+          </p:spPr>
+          <p:style>
+            <a:lnRef idx="2">
+              <a:schemeClr val="dk1"/>
+            </a:lnRef>
+            <a:fillRef idx="1">
+              <a:schemeClr val="lt1"/>
+            </a:fillRef>
+            <a:effectRef idx="0">
+              <a:schemeClr val="dk1"/>
+            </a:effectRef>
+            <a:fontRef idx="minor">
+              <a:schemeClr val="dk1"/>
+            </a:fontRef>
+          </p:style>
+          <p:txBody>
+            <a:bodyPr tIns="0" bIns="27432" rtlCol="0" anchor="ctr" anchorCtr="1"/>
+            <a:lstStyle/>
+            <a:p>
+              <a:pPr algn="ctr"/>
+              <a:r>
+                <a:rPr lang="en-US" sz="1200" b="1" dirty="0" smtClean="0">
+                  <a:solidFill>
+                    <a:srgbClr val="2C74A5"/>
+                  </a:solidFill>
+                  <a:latin typeface="Arial Narrow"/>
+                  <a:cs typeface="Arial Narrow"/>
+                </a:rPr>
+                <a:t>restaurant</a:t>
+              </a:r>
+              <a:endParaRPr lang="en-US" sz="2000" b="1" dirty="0">
                 <a:solidFill>
                   <a:srgbClr val="2C74A5"/>
                 </a:solidFill>
                 <a:latin typeface="Arial Narrow"/>
                 <a:cs typeface="Arial Narrow"/>
-              </a:rPr>
-              <a:t>dish</a:t>
-            </a:r>
-            <a:endParaRPr lang="en-US" sz="2000" b="1" dirty="0">
+              </a:endParaRPr>
+            </a:p>
+          </p:txBody>
+        </p:sp>
+        <p:sp>
+          <p:nvSpPr>
+            <p:cNvPr id="70" name="Rectangle 69"/>
+            <p:cNvSpPr/>
+            <p:nvPr/>
+          </p:nvSpPr>
+          <p:spPr>
+            <a:xfrm>
+              <a:off x="4697115" y="3686043"/>
+              <a:ext cx="498332" cy="229465"/>
+            </a:xfrm>
+            <a:prstGeom prst="rect">
+              <a:avLst/>
+            </a:prstGeom>
+            <a:solidFill>
+              <a:schemeClr val="bg1">
+                <a:lumMod val="95000"/>
+              </a:schemeClr>
+            </a:solidFill>
+            <a:ln w="12700" cmpd="sng">
               <a:solidFill>
                 <a:srgbClr val="2C74A5"/>
               </a:solidFill>
-              <a:latin typeface="Arial Narrow"/>
-              <a:cs typeface="Arial Narrow"/>
-            </a:endParaRPr>
-          </a:p>
-        </p:txBody>
-      </p:sp>
-      <p:sp>
-        <p:nvSpPr>
-          <p:cNvPr id="39" name="Rectangle 38"/>
-          <p:cNvSpPr/>
-          <p:nvPr/>
-        </p:nvSpPr>
-        <p:spPr>
-          <a:xfrm>
-            <a:off x="5290941" y="3686042"/>
-            <a:ext cx="599208" cy="229465"/>
-          </a:xfrm>
-          <a:prstGeom prst="rect">
-            <a:avLst/>
-          </a:prstGeom>
-          <a:solidFill>
-            <a:schemeClr val="bg1">
-              <a:lumMod val="95000"/>
-            </a:schemeClr>
-          </a:solidFill>
-          <a:ln w="12700" cmpd="sng">
-            <a:solidFill>
-              <a:srgbClr val="2C74A5"/>
-            </a:solidFill>
-          </a:ln>
-        </p:spPr>
-        <p:style>
-          <a:lnRef idx="2">
-            <a:schemeClr val="dk1"/>
-          </a:lnRef>
-          <a:fillRef idx="1">
-            <a:schemeClr val="lt1"/>
-          </a:fillRef>
-          <a:effectRef idx="0">
-            <a:schemeClr val="dk1"/>
-          </a:effectRef>
-          <a:fontRef idx="minor">
-            <a:schemeClr val="dk1"/>
-          </a:fontRef>
-        </p:style>
-        <p:txBody>
-          <a:bodyPr tIns="0" bIns="27432" rtlCol="0" anchor="ctr" anchorCtr="1"/>
-          <a:lstStyle/>
-          <a:p>
-            <a:pPr algn="ctr"/>
-            <a:r>
-              <a:rPr lang="en-US" sz="1200" b="1" dirty="0" smtClean="0">
+            </a:ln>
+          </p:spPr>
+          <p:style>
+            <a:lnRef idx="2">
+              <a:schemeClr val="dk1"/>
+            </a:lnRef>
+            <a:fillRef idx="1">
+              <a:schemeClr val="lt1"/>
+            </a:fillRef>
+            <a:effectRef idx="0">
+              <a:schemeClr val="dk1"/>
+            </a:effectRef>
+            <a:fontRef idx="minor">
+              <a:schemeClr val="dk1"/>
+            </a:fontRef>
+          </p:style>
+          <p:txBody>
+            <a:bodyPr tIns="0" bIns="27432" rtlCol="0" anchor="ctr" anchorCtr="1"/>
+            <a:lstStyle/>
+            <a:p>
+              <a:pPr algn="ctr"/>
+              <a:r>
+                <a:rPr lang="en-US" sz="1200" b="1" dirty="0" smtClean="0">
+                  <a:solidFill>
+                    <a:srgbClr val="2C74A5"/>
+                  </a:solidFill>
+                  <a:latin typeface="Arial Narrow"/>
+                  <a:cs typeface="Arial Narrow"/>
+                </a:rPr>
+                <a:t>dish</a:t>
+              </a:r>
+              <a:endParaRPr lang="en-US" sz="2000" b="1" dirty="0">
                 <a:solidFill>
                   <a:srgbClr val="2C74A5"/>
                 </a:solidFill>
                 <a:latin typeface="Arial Narrow"/>
                 <a:cs typeface="Arial Narrow"/>
-              </a:rPr>
-              <a:t>option</a:t>
-            </a:r>
-            <a:endParaRPr lang="en-US" sz="2000" b="1" dirty="0">
+              </a:endParaRPr>
+            </a:p>
+          </p:txBody>
+        </p:sp>
+        <p:sp>
+          <p:nvSpPr>
+            <p:cNvPr id="39" name="Rectangle 38"/>
+            <p:cNvSpPr/>
+            <p:nvPr/>
+          </p:nvSpPr>
+          <p:spPr>
+            <a:xfrm>
+              <a:off x="5290941" y="3686042"/>
+              <a:ext cx="599208" cy="229465"/>
+            </a:xfrm>
+            <a:prstGeom prst="rect">
+              <a:avLst/>
+            </a:prstGeom>
+            <a:solidFill>
+              <a:schemeClr val="bg1">
+                <a:lumMod val="95000"/>
+              </a:schemeClr>
+            </a:solidFill>
+            <a:ln w="12700" cmpd="sng">
               <a:solidFill>
                 <a:srgbClr val="2C74A5"/>
               </a:solidFill>
-              <a:latin typeface="Arial Narrow"/>
-              <a:cs typeface="Arial Narrow"/>
-            </a:endParaRPr>
-          </a:p>
-        </p:txBody>
-      </p:sp>
-      <p:sp>
-        <p:nvSpPr>
-          <p:cNvPr id="34" name="TextBox 33"/>
-          <p:cNvSpPr txBox="1"/>
-          <p:nvPr/>
-        </p:nvSpPr>
-        <p:spPr>
-          <a:xfrm>
-            <a:off x="1248023" y="1861866"/>
-            <a:ext cx="474810" cy="276999"/>
-          </a:xfrm>
-          <a:prstGeom prst="rect">
-            <a:avLst/>
-          </a:prstGeom>
-          <a:noFill/>
-        </p:spPr>
-        <p:txBody>
-          <a:bodyPr wrap="none" rtlCol="0" anchor="ctr">
-            <a:spAutoFit/>
-          </a:bodyPr>
-          <a:lstStyle/>
-          <a:p>
-            <a:pPr algn="ctr"/>
-            <a:r>
-              <a:rPr lang="en-US" sz="1200" dirty="0" smtClean="0">
-                <a:solidFill>
-                  <a:srgbClr val="A6A6A6"/>
+            </a:ln>
+          </p:spPr>
+          <p:style>
+            <a:lnRef idx="2">
+              <a:schemeClr val="dk1"/>
+            </a:lnRef>
+            <a:fillRef idx="1">
+              <a:schemeClr val="lt1"/>
+            </a:fillRef>
+            <a:effectRef idx="0">
+              <a:schemeClr val="dk1"/>
+            </a:effectRef>
+            <a:fontRef idx="minor">
+              <a:schemeClr val="dk1"/>
+            </a:fontRef>
+          </p:style>
+          <p:txBody>
+            <a:bodyPr tIns="0" bIns="27432" rtlCol="0" anchor="ctr" anchorCtr="1"/>
+            <a:lstStyle/>
+            <a:p>
+              <a:pPr algn="ctr"/>
+              <a:r>
+                <a:rPr lang="en-US" sz="1200" b="1" dirty="0" smtClean="0">
+                  <a:solidFill>
+                    <a:srgbClr val="2C74A5"/>
+                  </a:solidFill>
+                  <a:latin typeface="Arial Narrow"/>
+                  <a:cs typeface="Arial Narrow"/>
+                </a:rPr>
+                <a:t>option</a:t>
+              </a:r>
+              <a:endParaRPr lang="en-US" sz="2000" b="1" dirty="0">
+                <a:solidFill>
+                  <a:srgbClr val="2C74A5"/>
                 </a:solidFill>
                 <a:latin typeface="Arial Narrow"/>
                 <a:cs typeface="Arial Narrow"/>
-              </a:rPr>
-              <a:t>APP:</a:t>
-            </a:r>
-          </a:p>
-        </p:txBody>
-      </p:sp>
-      <p:sp>
-        <p:nvSpPr>
-          <p:cNvPr id="40" name="Rectangle 39"/>
-          <p:cNvSpPr/>
-          <p:nvPr/>
-        </p:nvSpPr>
-        <p:spPr>
-          <a:xfrm>
-            <a:off x="6045898" y="3686042"/>
-            <a:ext cx="907390" cy="229465"/>
-          </a:xfrm>
-          <a:prstGeom prst="rect">
-            <a:avLst/>
-          </a:prstGeom>
-          <a:solidFill>
-            <a:schemeClr val="bg1">
-              <a:lumMod val="95000"/>
-            </a:schemeClr>
-          </a:solidFill>
-          <a:ln w="12700" cmpd="sng">
+              </a:endParaRPr>
+            </a:p>
+          </p:txBody>
+        </p:sp>
+        <p:sp>
+          <p:nvSpPr>
+            <p:cNvPr id="34" name="TextBox 33"/>
+            <p:cNvSpPr txBox="1"/>
+            <p:nvPr/>
+          </p:nvSpPr>
+          <p:spPr>
+            <a:xfrm>
+              <a:off x="1248023" y="1861866"/>
+              <a:ext cx="474810" cy="276999"/>
+            </a:xfrm>
+            <a:prstGeom prst="rect">
+              <a:avLst/>
+            </a:prstGeom>
+            <a:noFill/>
+          </p:spPr>
+          <p:txBody>
+            <a:bodyPr wrap="none" rtlCol="0" anchor="ctr">
+              <a:spAutoFit/>
+            </a:bodyPr>
+            <a:lstStyle/>
+            <a:p>
+              <a:pPr algn="ctr"/>
+              <a:r>
+                <a:rPr lang="en-US" sz="1200" dirty="0" smtClean="0">
+                  <a:solidFill>
+                    <a:srgbClr val="A6A6A6"/>
+                  </a:solidFill>
+                  <a:latin typeface="Arial Narrow"/>
+                  <a:cs typeface="Arial Narrow"/>
+                </a:rPr>
+                <a:t>APP:</a:t>
+              </a:r>
+            </a:p>
+          </p:txBody>
+        </p:sp>
+        <p:sp>
+          <p:nvSpPr>
+            <p:cNvPr id="40" name="Rectangle 39"/>
+            <p:cNvSpPr/>
+            <p:nvPr/>
+          </p:nvSpPr>
+          <p:spPr>
+            <a:xfrm>
+              <a:off x="6045897" y="3686042"/>
+              <a:ext cx="966847" cy="229465"/>
+            </a:xfrm>
+            <a:prstGeom prst="rect">
+              <a:avLst/>
+            </a:prstGeom>
             <a:solidFill>
-              <a:srgbClr val="2C74A5"/>
+              <a:schemeClr val="bg1">
+                <a:lumMod val="95000"/>
+              </a:schemeClr>
             </a:solidFill>
-          </a:ln>
-        </p:spPr>
-        <p:style>
-          <a:lnRef idx="2">
-            <a:schemeClr val="dk1"/>
-          </a:lnRef>
-          <a:fillRef idx="1">
-            <a:schemeClr val="lt1"/>
-          </a:fillRef>
-          <a:effectRef idx="0">
-            <a:schemeClr val="dk1"/>
-          </a:effectRef>
-          <a:fontRef idx="minor">
-            <a:schemeClr val="dk1"/>
-          </a:fontRef>
-        </p:style>
-        <p:txBody>
-          <a:bodyPr tIns="0" bIns="27432" rtlCol="0" anchor="ctr" anchorCtr="1"/>
-          <a:lstStyle/>
-          <a:p>
-            <a:pPr algn="ctr"/>
-            <a:r>
-              <a:rPr lang="en-US" sz="1200" b="1" dirty="0" smtClean="0">
-                <a:solidFill>
-                  <a:srgbClr val="2C74A5"/>
-                </a:solidFill>
-                <a:latin typeface="Arial Narrow"/>
-                <a:cs typeface="Arial Narrow"/>
-              </a:rPr>
-              <a:t>sys:number</a:t>
-            </a:r>
-            <a:endParaRPr lang="en-US" sz="2000" b="1" dirty="0">
+            <a:ln w="12700" cmpd="sng">
               <a:solidFill>
                 <a:srgbClr val="2C74A5"/>
               </a:solidFill>
-              <a:latin typeface="Arial Narrow"/>
-              <a:cs typeface="Arial Narrow"/>
-            </a:endParaRPr>
-          </a:p>
-        </p:txBody>
-      </p:sp>
-      <p:cxnSp>
-        <p:nvCxnSpPr>
-          <p:cNvPr id="141" name="Straight Connector 140"/>
-          <p:cNvCxnSpPr>
-            <a:stCxn id="4" idx="2"/>
-            <a:endCxn id="7" idx="0"/>
-          </p:cNvCxnSpPr>
-          <p:nvPr/>
-        </p:nvCxnSpPr>
-        <p:spPr>
-          <a:xfrm>
-            <a:off x="4833545" y="2138865"/>
-            <a:ext cx="1" cy="366702"/>
-          </a:xfrm>
-          <a:prstGeom prst="line">
-            <a:avLst/>
-          </a:prstGeom>
-        </p:spPr>
-        <p:style>
-          <a:lnRef idx="1">
-            <a:schemeClr val="accent6"/>
-          </a:lnRef>
-          <a:fillRef idx="0">
-            <a:schemeClr val="accent6"/>
-          </a:fillRef>
-          <a:effectRef idx="0">
-            <a:schemeClr val="accent6"/>
-          </a:effectRef>
-          <a:fontRef idx="minor">
-            <a:schemeClr val="tx1"/>
-          </a:fontRef>
-        </p:style>
-      </p:cxnSp>
-      <p:cxnSp>
-        <p:nvCxnSpPr>
-          <p:cNvPr id="142" name="Straight Connector 141"/>
-          <p:cNvCxnSpPr/>
-          <p:nvPr/>
-        </p:nvCxnSpPr>
-        <p:spPr>
-          <a:xfrm>
-            <a:off x="4312871" y="2916832"/>
-            <a:ext cx="2" cy="196034"/>
-          </a:xfrm>
-          <a:prstGeom prst="line">
-            <a:avLst/>
-          </a:prstGeom>
-        </p:spPr>
-        <p:style>
-          <a:lnRef idx="1">
-            <a:schemeClr val="accent6"/>
-          </a:lnRef>
-          <a:fillRef idx="0">
-            <a:schemeClr val="accent6"/>
-          </a:fillRef>
-          <a:effectRef idx="0">
-            <a:schemeClr val="accent6"/>
-          </a:effectRef>
-          <a:fontRef idx="minor">
-            <a:schemeClr val="tx1"/>
-          </a:fontRef>
-        </p:style>
-      </p:cxnSp>
-      <p:cxnSp>
-        <p:nvCxnSpPr>
-          <p:cNvPr id="150" name="Straight Connector 149"/>
-          <p:cNvCxnSpPr/>
-          <p:nvPr/>
-        </p:nvCxnSpPr>
-        <p:spPr>
-          <a:xfrm flipH="1">
-            <a:off x="2402269" y="2908433"/>
-            <a:ext cx="5157216" cy="4739"/>
-          </a:xfrm>
-          <a:prstGeom prst="line">
-            <a:avLst/>
-          </a:prstGeom>
-          <a:ln>
-            <a:solidFill>
-              <a:srgbClr val="7F7F7F"/>
-            </a:solidFill>
-          </a:ln>
-        </p:spPr>
-        <p:style>
-          <a:lnRef idx="1">
-            <a:schemeClr val="dk1"/>
-          </a:lnRef>
-          <a:fillRef idx="0">
-            <a:schemeClr val="dk1"/>
-          </a:fillRef>
-          <a:effectRef idx="0">
-            <a:schemeClr val="dk1"/>
-          </a:effectRef>
-          <a:fontRef idx="minor">
-            <a:schemeClr val="tx1"/>
-          </a:fontRef>
-        </p:style>
-      </p:cxnSp>
-      <p:cxnSp>
-        <p:nvCxnSpPr>
-          <p:cNvPr id="152" name="Straight Connector 151"/>
-          <p:cNvCxnSpPr>
-            <a:endCxn id="35" idx="0"/>
-          </p:cNvCxnSpPr>
-          <p:nvPr/>
-        </p:nvCxnSpPr>
-        <p:spPr>
-          <a:xfrm>
-            <a:off x="5303763" y="2908433"/>
-            <a:ext cx="0" cy="188628"/>
-          </a:xfrm>
-          <a:prstGeom prst="line">
-            <a:avLst/>
-          </a:prstGeom>
-        </p:spPr>
-        <p:style>
-          <a:lnRef idx="1">
-            <a:schemeClr val="accent6"/>
-          </a:lnRef>
-          <a:fillRef idx="0">
-            <a:schemeClr val="accent6"/>
-          </a:fillRef>
-          <a:effectRef idx="0">
-            <a:schemeClr val="accent6"/>
-          </a:effectRef>
-          <a:fontRef idx="minor">
-            <a:schemeClr val="tx1"/>
-          </a:fontRef>
-        </p:style>
-      </p:cxnSp>
-      <p:cxnSp>
-        <p:nvCxnSpPr>
-          <p:cNvPr id="155" name="Straight Connector 154"/>
-          <p:cNvCxnSpPr>
-            <a:endCxn id="66" idx="0"/>
-          </p:cNvCxnSpPr>
-          <p:nvPr/>
-        </p:nvCxnSpPr>
-        <p:spPr>
-          <a:xfrm>
-            <a:off x="6109139" y="2908433"/>
-            <a:ext cx="1" cy="187801"/>
-          </a:xfrm>
-          <a:prstGeom prst="line">
-            <a:avLst/>
-          </a:prstGeom>
-        </p:spPr>
-        <p:style>
-          <a:lnRef idx="1">
-            <a:schemeClr val="accent6"/>
-          </a:lnRef>
-          <a:fillRef idx="0">
-            <a:schemeClr val="accent6"/>
-          </a:fillRef>
-          <a:effectRef idx="0">
-            <a:schemeClr val="accent6"/>
-          </a:effectRef>
-          <a:fontRef idx="minor">
-            <a:schemeClr val="tx1"/>
-          </a:fontRef>
-        </p:style>
-      </p:cxnSp>
-      <p:cxnSp>
-        <p:nvCxnSpPr>
-          <p:cNvPr id="158" name="Straight Connector 157"/>
-          <p:cNvCxnSpPr>
-            <a:endCxn id="67" idx="0"/>
-          </p:cNvCxnSpPr>
-          <p:nvPr/>
-        </p:nvCxnSpPr>
-        <p:spPr>
-          <a:xfrm>
-            <a:off x="6727077" y="2914919"/>
-            <a:ext cx="0" cy="181314"/>
-          </a:xfrm>
-          <a:prstGeom prst="line">
-            <a:avLst/>
-          </a:prstGeom>
-        </p:spPr>
-        <p:style>
-          <a:lnRef idx="1">
-            <a:schemeClr val="accent6"/>
-          </a:lnRef>
-          <a:fillRef idx="0">
-            <a:schemeClr val="accent6"/>
-          </a:fillRef>
-          <a:effectRef idx="0">
-            <a:schemeClr val="accent6"/>
-          </a:effectRef>
-          <a:fontRef idx="minor">
-            <a:schemeClr val="tx1"/>
-          </a:fontRef>
-        </p:style>
-      </p:cxnSp>
-      <p:cxnSp>
-        <p:nvCxnSpPr>
-          <p:cNvPr id="161" name="Straight Connector 160"/>
-          <p:cNvCxnSpPr>
-            <a:endCxn id="36" idx="0"/>
-          </p:cNvCxnSpPr>
-          <p:nvPr/>
-        </p:nvCxnSpPr>
-        <p:spPr>
-          <a:xfrm>
-            <a:off x="7554480" y="2914919"/>
-            <a:ext cx="1" cy="181314"/>
-          </a:xfrm>
-          <a:prstGeom prst="line">
-            <a:avLst/>
-          </a:prstGeom>
-        </p:spPr>
-        <p:style>
-          <a:lnRef idx="1">
-            <a:schemeClr val="accent6"/>
-          </a:lnRef>
-          <a:fillRef idx="0">
-            <a:schemeClr val="accent6"/>
-          </a:fillRef>
-          <a:effectRef idx="0">
-            <a:schemeClr val="accent6"/>
-          </a:effectRef>
-          <a:fontRef idx="minor">
-            <a:schemeClr val="tx1"/>
-          </a:fontRef>
-        </p:style>
-      </p:cxnSp>
-      <p:cxnSp>
-        <p:nvCxnSpPr>
-          <p:cNvPr id="166" name="Straight Connector 165"/>
-          <p:cNvCxnSpPr>
-            <a:endCxn id="56" idx="0"/>
-          </p:cNvCxnSpPr>
-          <p:nvPr/>
-        </p:nvCxnSpPr>
-        <p:spPr>
-          <a:xfrm>
-            <a:off x="3301209" y="2911994"/>
-            <a:ext cx="1" cy="192472"/>
-          </a:xfrm>
-          <a:prstGeom prst="line">
-            <a:avLst/>
-          </a:prstGeom>
-        </p:spPr>
-        <p:style>
-          <a:lnRef idx="1">
-            <a:schemeClr val="accent6"/>
-          </a:lnRef>
-          <a:fillRef idx="0">
-            <a:schemeClr val="accent6"/>
-          </a:fillRef>
-          <a:effectRef idx="0">
-            <a:schemeClr val="accent6"/>
-          </a:effectRef>
-          <a:fontRef idx="minor">
-            <a:schemeClr val="tx1"/>
-          </a:fontRef>
-        </p:style>
-      </p:cxnSp>
-      <p:cxnSp>
-        <p:nvCxnSpPr>
-          <p:cNvPr id="169" name="Straight Connector 168"/>
-          <p:cNvCxnSpPr>
-            <a:endCxn id="25" idx="0"/>
-          </p:cNvCxnSpPr>
-          <p:nvPr/>
-        </p:nvCxnSpPr>
-        <p:spPr>
-          <a:xfrm>
-            <a:off x="2404366" y="2911994"/>
-            <a:ext cx="1" cy="200872"/>
-          </a:xfrm>
-          <a:prstGeom prst="line">
-            <a:avLst/>
-          </a:prstGeom>
-        </p:spPr>
-        <p:style>
-          <a:lnRef idx="1">
-            <a:schemeClr val="accent6"/>
-          </a:lnRef>
-          <a:fillRef idx="0">
-            <a:schemeClr val="accent6"/>
-          </a:fillRef>
-          <a:effectRef idx="0">
-            <a:schemeClr val="accent6"/>
-          </a:effectRef>
-          <a:fontRef idx="minor">
-            <a:schemeClr val="tx1"/>
-          </a:fontRef>
-        </p:style>
-      </p:cxnSp>
-      <p:cxnSp>
-        <p:nvCxnSpPr>
-          <p:cNvPr id="172" name="Straight Connector 171"/>
-          <p:cNvCxnSpPr>
-            <a:stCxn id="7" idx="2"/>
-          </p:cNvCxnSpPr>
-          <p:nvPr/>
-        </p:nvCxnSpPr>
-        <p:spPr>
-          <a:xfrm flipH="1">
-            <a:off x="4833544" y="2735032"/>
-            <a:ext cx="2" cy="179887"/>
-          </a:xfrm>
-          <a:prstGeom prst="line">
-            <a:avLst/>
-          </a:prstGeom>
-        </p:spPr>
-        <p:style>
-          <a:lnRef idx="1">
-            <a:schemeClr val="accent6"/>
-          </a:lnRef>
-          <a:fillRef idx="0">
-            <a:schemeClr val="accent6"/>
-          </a:fillRef>
-          <a:effectRef idx="0">
-            <a:schemeClr val="accent6"/>
-          </a:effectRef>
-          <a:fontRef idx="minor">
-            <a:schemeClr val="tx1"/>
-          </a:fontRef>
-        </p:style>
-      </p:cxnSp>
-      <p:cxnSp>
-        <p:nvCxnSpPr>
-          <p:cNvPr id="175" name="Straight Connector 174"/>
-          <p:cNvCxnSpPr/>
-          <p:nvPr/>
-        </p:nvCxnSpPr>
-        <p:spPr>
-          <a:xfrm flipH="1">
-            <a:off x="2639197" y="3507667"/>
-            <a:ext cx="3867912" cy="2751"/>
-          </a:xfrm>
-          <a:prstGeom prst="line">
-            <a:avLst/>
-          </a:prstGeom>
-          <a:ln>
-            <a:solidFill>
-              <a:srgbClr val="7F7F7F"/>
-            </a:solidFill>
-          </a:ln>
-        </p:spPr>
-        <p:style>
-          <a:lnRef idx="1">
-            <a:schemeClr val="dk1"/>
-          </a:lnRef>
-          <a:fillRef idx="0">
-            <a:schemeClr val="dk1"/>
-          </a:fillRef>
-          <a:effectRef idx="0">
-            <a:schemeClr val="dk1"/>
-          </a:effectRef>
-          <a:fontRef idx="minor">
-            <a:schemeClr val="tx1"/>
-          </a:fontRef>
-        </p:style>
-      </p:cxnSp>
-      <p:cxnSp>
-        <p:nvCxnSpPr>
-          <p:cNvPr id="176" name="Straight Connector 175"/>
-          <p:cNvCxnSpPr>
-            <a:endCxn id="70" idx="0"/>
-          </p:cNvCxnSpPr>
-          <p:nvPr/>
-        </p:nvCxnSpPr>
-        <p:spPr>
-          <a:xfrm>
-            <a:off x="4944004" y="3510159"/>
-            <a:ext cx="2277" cy="175884"/>
-          </a:xfrm>
-          <a:prstGeom prst="line">
-            <a:avLst/>
-          </a:prstGeom>
-          <a:ln>
-            <a:solidFill>
-              <a:srgbClr val="7F7F7F"/>
-            </a:solidFill>
-          </a:ln>
-        </p:spPr>
-        <p:style>
-          <a:lnRef idx="1">
-            <a:schemeClr val="dk1"/>
-          </a:lnRef>
-          <a:fillRef idx="0">
-            <a:schemeClr val="dk1"/>
-          </a:fillRef>
-          <a:effectRef idx="0">
-            <a:schemeClr val="dk1"/>
-          </a:effectRef>
-          <a:fontRef idx="minor">
-            <a:schemeClr val="tx1"/>
-          </a:fontRef>
-        </p:style>
-      </p:cxnSp>
-      <p:cxnSp>
-        <p:nvCxnSpPr>
-          <p:cNvPr id="179" name="Straight Connector 178"/>
-          <p:cNvCxnSpPr>
-            <a:endCxn id="39" idx="0"/>
-          </p:cNvCxnSpPr>
-          <p:nvPr/>
-        </p:nvCxnSpPr>
-        <p:spPr>
-          <a:xfrm flipH="1">
-            <a:off x="5590545" y="3510159"/>
-            <a:ext cx="976" cy="175883"/>
-          </a:xfrm>
-          <a:prstGeom prst="line">
-            <a:avLst/>
-          </a:prstGeom>
-          <a:ln>
-            <a:solidFill>
-              <a:srgbClr val="7F7F7F"/>
-            </a:solidFill>
-          </a:ln>
-        </p:spPr>
-        <p:style>
-          <a:lnRef idx="1">
-            <a:schemeClr val="dk1"/>
-          </a:lnRef>
-          <a:fillRef idx="0">
-            <a:schemeClr val="dk1"/>
-          </a:fillRef>
-          <a:effectRef idx="0">
-            <a:schemeClr val="dk1"/>
-          </a:effectRef>
-          <a:fontRef idx="minor">
-            <a:schemeClr val="tx1"/>
-          </a:fontRef>
-        </p:style>
-      </p:cxnSp>
-      <p:cxnSp>
-        <p:nvCxnSpPr>
-          <p:cNvPr id="186" name="Straight Connector 185"/>
-          <p:cNvCxnSpPr>
-            <a:endCxn id="69" idx="0"/>
-          </p:cNvCxnSpPr>
-          <p:nvPr/>
-        </p:nvCxnSpPr>
-        <p:spPr>
-          <a:xfrm flipH="1">
-            <a:off x="2639198" y="3510418"/>
-            <a:ext cx="3374" cy="178140"/>
-          </a:xfrm>
-          <a:prstGeom prst="line">
-            <a:avLst/>
-          </a:prstGeom>
-          <a:ln>
-            <a:solidFill>
-              <a:srgbClr val="7F7F7F"/>
-            </a:solidFill>
-          </a:ln>
-        </p:spPr>
-        <p:style>
-          <a:lnRef idx="1">
-            <a:schemeClr val="dk1"/>
-          </a:lnRef>
-          <a:fillRef idx="0">
-            <a:schemeClr val="dk1"/>
-          </a:fillRef>
-          <a:effectRef idx="0">
-            <a:schemeClr val="dk1"/>
-          </a:effectRef>
-          <a:fontRef idx="minor">
-            <a:schemeClr val="tx1"/>
-          </a:fontRef>
-        </p:style>
-      </p:cxnSp>
-      <p:cxnSp>
-        <p:nvCxnSpPr>
-          <p:cNvPr id="189" name="Straight Connector 188"/>
-          <p:cNvCxnSpPr>
-            <a:endCxn id="40" idx="0"/>
-          </p:cNvCxnSpPr>
-          <p:nvPr/>
-        </p:nvCxnSpPr>
-        <p:spPr>
-          <a:xfrm>
-            <a:off x="6499593" y="3510159"/>
-            <a:ext cx="0" cy="175883"/>
-          </a:xfrm>
-          <a:prstGeom prst="line">
-            <a:avLst/>
-          </a:prstGeom>
-          <a:ln>
-            <a:solidFill>
-              <a:srgbClr val="7F7F7F"/>
-            </a:solidFill>
-          </a:ln>
-        </p:spPr>
-        <p:style>
-          <a:lnRef idx="1">
-            <a:schemeClr val="dk1"/>
-          </a:lnRef>
-          <a:fillRef idx="0">
-            <a:schemeClr val="dk1"/>
-          </a:fillRef>
-          <a:effectRef idx="0">
-            <a:schemeClr val="dk1"/>
-          </a:effectRef>
-          <a:fontRef idx="minor">
-            <a:schemeClr val="tx1"/>
-          </a:fontRef>
-        </p:style>
-      </p:cxnSp>
-      <p:cxnSp>
-        <p:nvCxnSpPr>
-          <p:cNvPr id="196" name="Straight Connector 195"/>
-          <p:cNvCxnSpPr>
-            <a:stCxn id="56" idx="2"/>
-          </p:cNvCxnSpPr>
-          <p:nvPr/>
-        </p:nvCxnSpPr>
-        <p:spPr>
-          <a:xfrm>
-            <a:off x="3301210" y="3333931"/>
-            <a:ext cx="2276" cy="173736"/>
-          </a:xfrm>
-          <a:prstGeom prst="line">
-            <a:avLst/>
-          </a:prstGeom>
-          <a:ln>
-            <a:solidFill>
-              <a:srgbClr val="7F7F7F"/>
-            </a:solidFill>
-          </a:ln>
-        </p:spPr>
-        <p:style>
-          <a:lnRef idx="1">
-            <a:schemeClr val="dk1"/>
-          </a:lnRef>
-          <a:fillRef idx="0">
-            <a:schemeClr val="dk1"/>
-          </a:fillRef>
-          <a:effectRef idx="0">
-            <a:schemeClr val="dk1"/>
-          </a:effectRef>
-          <a:fontRef idx="minor">
-            <a:schemeClr val="tx1"/>
-          </a:fontRef>
-        </p:style>
-      </p:cxnSp>
-      <p:sp>
-        <p:nvSpPr>
-          <p:cNvPr id="200" name="Rectangle 199"/>
-          <p:cNvSpPr/>
-          <p:nvPr/>
-        </p:nvSpPr>
-        <p:spPr>
-          <a:xfrm>
-            <a:off x="3139159" y="3686043"/>
-            <a:ext cx="649792" cy="229465"/>
-          </a:xfrm>
-          <a:prstGeom prst="rect">
-            <a:avLst/>
-          </a:prstGeom>
-          <a:solidFill>
-            <a:schemeClr val="bg1">
-              <a:lumMod val="95000"/>
-            </a:schemeClr>
-          </a:solidFill>
-          <a:ln w="12700" cmpd="sng">
-            <a:solidFill>
-              <a:srgbClr val="2C74A5"/>
-            </a:solidFill>
-          </a:ln>
-        </p:spPr>
-        <p:style>
-          <a:lnRef idx="2">
-            <a:schemeClr val="dk1"/>
-          </a:lnRef>
-          <a:fillRef idx="1">
-            <a:schemeClr val="lt1"/>
-          </a:fillRef>
-          <a:effectRef idx="0">
-            <a:schemeClr val="dk1"/>
-          </a:effectRef>
-          <a:fontRef idx="minor">
-            <a:schemeClr val="dk1"/>
-          </a:fontRef>
-        </p:style>
-        <p:txBody>
-          <a:bodyPr tIns="0" bIns="27432" rtlCol="0" anchor="ctr" anchorCtr="1"/>
-          <a:lstStyle/>
-          <a:p>
-            <a:pPr algn="ctr"/>
-            <a:r>
-              <a:rPr lang="en-US" sz="1200" b="1" dirty="0" smtClean="0">
+            </a:ln>
+          </p:spPr>
+          <p:style>
+            <a:lnRef idx="2">
+              <a:schemeClr val="dk1"/>
+            </a:lnRef>
+            <a:fillRef idx="1">
+              <a:schemeClr val="lt1"/>
+            </a:fillRef>
+            <a:effectRef idx="0">
+              <a:schemeClr val="dk1"/>
+            </a:effectRef>
+            <a:fontRef idx="minor">
+              <a:schemeClr val="dk1"/>
+            </a:fontRef>
+          </p:style>
+          <p:txBody>
+            <a:bodyPr tIns="0" bIns="27432" rtlCol="0" anchor="ctr" anchorCtr="1"/>
+            <a:lstStyle/>
+            <a:p>
+              <a:pPr algn="ctr"/>
+              <a:r>
+                <a:rPr lang="en-US" sz="1200" b="1" dirty="0" smtClean="0">
+                  <a:solidFill>
+                    <a:srgbClr val="2C74A5"/>
+                  </a:solidFill>
+                  <a:latin typeface="Arial Narrow"/>
+                  <a:cs typeface="Arial Narrow"/>
+                </a:rPr>
+                <a:t>sys_number</a:t>
+              </a:r>
+              <a:endParaRPr lang="en-US" sz="2000" b="1" dirty="0">
                 <a:solidFill>
                   <a:srgbClr val="2C74A5"/>
                 </a:solidFill>
                 <a:latin typeface="Arial Narrow"/>
                 <a:cs typeface="Arial Narrow"/>
-              </a:rPr>
-              <a:t>cuisine</a:t>
-            </a:r>
-            <a:endParaRPr lang="en-US" sz="2000" b="1" dirty="0">
+              </a:endParaRPr>
+            </a:p>
+          </p:txBody>
+        </p:sp>
+        <p:cxnSp>
+          <p:nvCxnSpPr>
+            <p:cNvPr id="141" name="Straight Connector 140"/>
+            <p:cNvCxnSpPr>
+              <a:stCxn id="4" idx="2"/>
+              <a:endCxn id="7" idx="0"/>
+            </p:cNvCxnSpPr>
+            <p:nvPr/>
+          </p:nvCxnSpPr>
+          <p:spPr>
+            <a:xfrm>
+              <a:off x="4833545" y="2138865"/>
+              <a:ext cx="1" cy="366702"/>
+            </a:xfrm>
+            <a:prstGeom prst="line">
+              <a:avLst/>
+            </a:prstGeom>
+          </p:spPr>
+          <p:style>
+            <a:lnRef idx="1">
+              <a:schemeClr val="accent6"/>
+            </a:lnRef>
+            <a:fillRef idx="0">
+              <a:schemeClr val="accent6"/>
+            </a:fillRef>
+            <a:effectRef idx="0">
+              <a:schemeClr val="accent6"/>
+            </a:effectRef>
+            <a:fontRef idx="minor">
+              <a:schemeClr val="tx1"/>
+            </a:fontRef>
+          </p:style>
+        </p:cxnSp>
+        <p:cxnSp>
+          <p:nvCxnSpPr>
+            <p:cNvPr id="142" name="Straight Connector 141"/>
+            <p:cNvCxnSpPr/>
+            <p:nvPr/>
+          </p:nvCxnSpPr>
+          <p:spPr>
+            <a:xfrm>
+              <a:off x="4312871" y="2916832"/>
+              <a:ext cx="2" cy="196034"/>
+            </a:xfrm>
+            <a:prstGeom prst="line">
+              <a:avLst/>
+            </a:prstGeom>
+          </p:spPr>
+          <p:style>
+            <a:lnRef idx="1">
+              <a:schemeClr val="accent6"/>
+            </a:lnRef>
+            <a:fillRef idx="0">
+              <a:schemeClr val="accent6"/>
+            </a:fillRef>
+            <a:effectRef idx="0">
+              <a:schemeClr val="accent6"/>
+            </a:effectRef>
+            <a:fontRef idx="minor">
+              <a:schemeClr val="tx1"/>
+            </a:fontRef>
+          </p:style>
+        </p:cxnSp>
+        <p:cxnSp>
+          <p:nvCxnSpPr>
+            <p:cNvPr id="150" name="Straight Connector 149"/>
+            <p:cNvCxnSpPr/>
+            <p:nvPr/>
+          </p:nvCxnSpPr>
+          <p:spPr>
+            <a:xfrm flipH="1">
+              <a:off x="2402269" y="2908433"/>
+              <a:ext cx="5157216" cy="4739"/>
+            </a:xfrm>
+            <a:prstGeom prst="line">
+              <a:avLst/>
+            </a:prstGeom>
+            <a:ln>
+              <a:solidFill>
+                <a:srgbClr val="7F7F7F"/>
+              </a:solidFill>
+            </a:ln>
+          </p:spPr>
+          <p:style>
+            <a:lnRef idx="1">
+              <a:schemeClr val="dk1"/>
+            </a:lnRef>
+            <a:fillRef idx="0">
+              <a:schemeClr val="dk1"/>
+            </a:fillRef>
+            <a:effectRef idx="0">
+              <a:schemeClr val="dk1"/>
+            </a:effectRef>
+            <a:fontRef idx="minor">
+              <a:schemeClr val="tx1"/>
+            </a:fontRef>
+          </p:style>
+        </p:cxnSp>
+        <p:cxnSp>
+          <p:nvCxnSpPr>
+            <p:cNvPr id="152" name="Straight Connector 151"/>
+            <p:cNvCxnSpPr>
+              <a:endCxn id="35" idx="0"/>
+            </p:cNvCxnSpPr>
+            <p:nvPr/>
+          </p:nvCxnSpPr>
+          <p:spPr>
+            <a:xfrm>
+              <a:off x="5303763" y="2908433"/>
+              <a:ext cx="0" cy="188628"/>
+            </a:xfrm>
+            <a:prstGeom prst="line">
+              <a:avLst/>
+            </a:prstGeom>
+          </p:spPr>
+          <p:style>
+            <a:lnRef idx="1">
+              <a:schemeClr val="accent6"/>
+            </a:lnRef>
+            <a:fillRef idx="0">
+              <a:schemeClr val="accent6"/>
+            </a:fillRef>
+            <a:effectRef idx="0">
+              <a:schemeClr val="accent6"/>
+            </a:effectRef>
+            <a:fontRef idx="minor">
+              <a:schemeClr val="tx1"/>
+            </a:fontRef>
+          </p:style>
+        </p:cxnSp>
+        <p:cxnSp>
+          <p:nvCxnSpPr>
+            <p:cNvPr id="155" name="Straight Connector 154"/>
+            <p:cNvCxnSpPr>
+              <a:endCxn id="66" idx="0"/>
+            </p:cNvCxnSpPr>
+            <p:nvPr/>
+          </p:nvCxnSpPr>
+          <p:spPr>
+            <a:xfrm>
+              <a:off x="6109139" y="2908433"/>
+              <a:ext cx="1" cy="187801"/>
+            </a:xfrm>
+            <a:prstGeom prst="line">
+              <a:avLst/>
+            </a:prstGeom>
+          </p:spPr>
+          <p:style>
+            <a:lnRef idx="1">
+              <a:schemeClr val="accent6"/>
+            </a:lnRef>
+            <a:fillRef idx="0">
+              <a:schemeClr val="accent6"/>
+            </a:fillRef>
+            <a:effectRef idx="0">
+              <a:schemeClr val="accent6"/>
+            </a:effectRef>
+            <a:fontRef idx="minor">
+              <a:schemeClr val="tx1"/>
+            </a:fontRef>
+          </p:style>
+        </p:cxnSp>
+        <p:cxnSp>
+          <p:nvCxnSpPr>
+            <p:cNvPr id="158" name="Straight Connector 157"/>
+            <p:cNvCxnSpPr>
+              <a:endCxn id="67" idx="0"/>
+            </p:cNvCxnSpPr>
+            <p:nvPr/>
+          </p:nvCxnSpPr>
+          <p:spPr>
+            <a:xfrm>
+              <a:off x="6727077" y="2914919"/>
+              <a:ext cx="0" cy="181314"/>
+            </a:xfrm>
+            <a:prstGeom prst="line">
+              <a:avLst/>
+            </a:prstGeom>
+          </p:spPr>
+          <p:style>
+            <a:lnRef idx="1">
+              <a:schemeClr val="accent6"/>
+            </a:lnRef>
+            <a:fillRef idx="0">
+              <a:schemeClr val="accent6"/>
+            </a:fillRef>
+            <a:effectRef idx="0">
+              <a:schemeClr val="accent6"/>
+            </a:effectRef>
+            <a:fontRef idx="minor">
+              <a:schemeClr val="tx1"/>
+            </a:fontRef>
+          </p:style>
+        </p:cxnSp>
+        <p:cxnSp>
+          <p:nvCxnSpPr>
+            <p:cNvPr id="161" name="Straight Connector 160"/>
+            <p:cNvCxnSpPr>
+              <a:endCxn id="36" idx="0"/>
+            </p:cNvCxnSpPr>
+            <p:nvPr/>
+          </p:nvCxnSpPr>
+          <p:spPr>
+            <a:xfrm>
+              <a:off x="7554480" y="2914919"/>
+              <a:ext cx="1" cy="181314"/>
+            </a:xfrm>
+            <a:prstGeom prst="line">
+              <a:avLst/>
+            </a:prstGeom>
+          </p:spPr>
+          <p:style>
+            <a:lnRef idx="1">
+              <a:schemeClr val="accent6"/>
+            </a:lnRef>
+            <a:fillRef idx="0">
+              <a:schemeClr val="accent6"/>
+            </a:fillRef>
+            <a:effectRef idx="0">
+              <a:schemeClr val="accent6"/>
+            </a:effectRef>
+            <a:fontRef idx="minor">
+              <a:schemeClr val="tx1"/>
+            </a:fontRef>
+          </p:style>
+        </p:cxnSp>
+        <p:cxnSp>
+          <p:nvCxnSpPr>
+            <p:cNvPr id="166" name="Straight Connector 165"/>
+            <p:cNvCxnSpPr>
+              <a:endCxn id="56" idx="0"/>
+            </p:cNvCxnSpPr>
+            <p:nvPr/>
+          </p:nvCxnSpPr>
+          <p:spPr>
+            <a:xfrm>
+              <a:off x="3301209" y="2911994"/>
+              <a:ext cx="1" cy="192472"/>
+            </a:xfrm>
+            <a:prstGeom prst="line">
+              <a:avLst/>
+            </a:prstGeom>
+          </p:spPr>
+          <p:style>
+            <a:lnRef idx="1">
+              <a:schemeClr val="accent6"/>
+            </a:lnRef>
+            <a:fillRef idx="0">
+              <a:schemeClr val="accent6"/>
+            </a:fillRef>
+            <a:effectRef idx="0">
+              <a:schemeClr val="accent6"/>
+            </a:effectRef>
+            <a:fontRef idx="minor">
+              <a:schemeClr val="tx1"/>
+            </a:fontRef>
+          </p:style>
+        </p:cxnSp>
+        <p:cxnSp>
+          <p:nvCxnSpPr>
+            <p:cNvPr id="169" name="Straight Connector 168"/>
+            <p:cNvCxnSpPr>
+              <a:endCxn id="25" idx="0"/>
+            </p:cNvCxnSpPr>
+            <p:nvPr/>
+          </p:nvCxnSpPr>
+          <p:spPr>
+            <a:xfrm>
+              <a:off x="2404366" y="2911994"/>
+              <a:ext cx="1" cy="200872"/>
+            </a:xfrm>
+            <a:prstGeom prst="line">
+              <a:avLst/>
+            </a:prstGeom>
+          </p:spPr>
+          <p:style>
+            <a:lnRef idx="1">
+              <a:schemeClr val="accent6"/>
+            </a:lnRef>
+            <a:fillRef idx="0">
+              <a:schemeClr val="accent6"/>
+            </a:fillRef>
+            <a:effectRef idx="0">
+              <a:schemeClr val="accent6"/>
+            </a:effectRef>
+            <a:fontRef idx="minor">
+              <a:schemeClr val="tx1"/>
+            </a:fontRef>
+          </p:style>
+        </p:cxnSp>
+        <p:cxnSp>
+          <p:nvCxnSpPr>
+            <p:cNvPr id="172" name="Straight Connector 171"/>
+            <p:cNvCxnSpPr>
+              <a:stCxn id="7" idx="2"/>
+            </p:cNvCxnSpPr>
+            <p:nvPr/>
+          </p:nvCxnSpPr>
+          <p:spPr>
+            <a:xfrm flipH="1">
+              <a:off x="4833544" y="2735032"/>
+              <a:ext cx="2" cy="179887"/>
+            </a:xfrm>
+            <a:prstGeom prst="line">
+              <a:avLst/>
+            </a:prstGeom>
+          </p:spPr>
+          <p:style>
+            <a:lnRef idx="1">
+              <a:schemeClr val="accent6"/>
+            </a:lnRef>
+            <a:fillRef idx="0">
+              <a:schemeClr val="accent6"/>
+            </a:fillRef>
+            <a:effectRef idx="0">
+              <a:schemeClr val="accent6"/>
+            </a:effectRef>
+            <a:fontRef idx="minor">
+              <a:schemeClr val="tx1"/>
+            </a:fontRef>
+          </p:style>
+        </p:cxnSp>
+        <p:cxnSp>
+          <p:nvCxnSpPr>
+            <p:cNvPr id="175" name="Straight Connector 174"/>
+            <p:cNvCxnSpPr/>
+            <p:nvPr/>
+          </p:nvCxnSpPr>
+          <p:spPr>
+            <a:xfrm flipH="1">
+              <a:off x="2639197" y="3507667"/>
+              <a:ext cx="3877056" cy="2751"/>
+            </a:xfrm>
+            <a:prstGeom prst="line">
+              <a:avLst/>
+            </a:prstGeom>
+            <a:ln>
+              <a:solidFill>
+                <a:srgbClr val="7F7F7F"/>
+              </a:solidFill>
+            </a:ln>
+          </p:spPr>
+          <p:style>
+            <a:lnRef idx="1">
+              <a:schemeClr val="dk1"/>
+            </a:lnRef>
+            <a:fillRef idx="0">
+              <a:schemeClr val="dk1"/>
+            </a:fillRef>
+            <a:effectRef idx="0">
+              <a:schemeClr val="dk1"/>
+            </a:effectRef>
+            <a:fontRef idx="minor">
+              <a:schemeClr val="tx1"/>
+            </a:fontRef>
+          </p:style>
+        </p:cxnSp>
+        <p:cxnSp>
+          <p:nvCxnSpPr>
+            <p:cNvPr id="176" name="Straight Connector 175"/>
+            <p:cNvCxnSpPr>
+              <a:endCxn id="70" idx="0"/>
+            </p:cNvCxnSpPr>
+            <p:nvPr/>
+          </p:nvCxnSpPr>
+          <p:spPr>
+            <a:xfrm>
+              <a:off x="4944004" y="3510159"/>
+              <a:ext cx="2277" cy="175884"/>
+            </a:xfrm>
+            <a:prstGeom prst="line">
+              <a:avLst/>
+            </a:prstGeom>
+            <a:ln>
+              <a:solidFill>
+                <a:srgbClr val="7F7F7F"/>
+              </a:solidFill>
+            </a:ln>
+          </p:spPr>
+          <p:style>
+            <a:lnRef idx="1">
+              <a:schemeClr val="dk1"/>
+            </a:lnRef>
+            <a:fillRef idx="0">
+              <a:schemeClr val="dk1"/>
+            </a:fillRef>
+            <a:effectRef idx="0">
+              <a:schemeClr val="dk1"/>
+            </a:effectRef>
+            <a:fontRef idx="minor">
+              <a:schemeClr val="tx1"/>
+            </a:fontRef>
+          </p:style>
+        </p:cxnSp>
+        <p:cxnSp>
+          <p:nvCxnSpPr>
+            <p:cNvPr id="179" name="Straight Connector 178"/>
+            <p:cNvCxnSpPr>
+              <a:endCxn id="39" idx="0"/>
+            </p:cNvCxnSpPr>
+            <p:nvPr/>
+          </p:nvCxnSpPr>
+          <p:spPr>
+            <a:xfrm flipH="1">
+              <a:off x="5590545" y="3510159"/>
+              <a:ext cx="976" cy="175883"/>
+            </a:xfrm>
+            <a:prstGeom prst="line">
+              <a:avLst/>
+            </a:prstGeom>
+            <a:ln>
+              <a:solidFill>
+                <a:srgbClr val="7F7F7F"/>
+              </a:solidFill>
+            </a:ln>
+          </p:spPr>
+          <p:style>
+            <a:lnRef idx="1">
+              <a:schemeClr val="dk1"/>
+            </a:lnRef>
+            <a:fillRef idx="0">
+              <a:schemeClr val="dk1"/>
+            </a:fillRef>
+            <a:effectRef idx="0">
+              <a:schemeClr val="dk1"/>
+            </a:effectRef>
+            <a:fontRef idx="minor">
+              <a:schemeClr val="tx1"/>
+            </a:fontRef>
+          </p:style>
+        </p:cxnSp>
+        <p:cxnSp>
+          <p:nvCxnSpPr>
+            <p:cNvPr id="186" name="Straight Connector 185"/>
+            <p:cNvCxnSpPr>
+              <a:endCxn id="69" idx="0"/>
+            </p:cNvCxnSpPr>
+            <p:nvPr/>
+          </p:nvCxnSpPr>
+          <p:spPr>
+            <a:xfrm flipH="1">
+              <a:off x="2639198" y="3510418"/>
+              <a:ext cx="3374" cy="178140"/>
+            </a:xfrm>
+            <a:prstGeom prst="line">
+              <a:avLst/>
+            </a:prstGeom>
+            <a:ln>
+              <a:solidFill>
+                <a:srgbClr val="7F7F7F"/>
+              </a:solidFill>
+            </a:ln>
+          </p:spPr>
+          <p:style>
+            <a:lnRef idx="1">
+              <a:schemeClr val="dk1"/>
+            </a:lnRef>
+            <a:fillRef idx="0">
+              <a:schemeClr val="dk1"/>
+            </a:fillRef>
+            <a:effectRef idx="0">
+              <a:schemeClr val="dk1"/>
+            </a:effectRef>
+            <a:fontRef idx="minor">
+              <a:schemeClr val="tx1"/>
+            </a:fontRef>
+          </p:style>
+        </p:cxnSp>
+        <p:cxnSp>
+          <p:nvCxnSpPr>
+            <p:cNvPr id="189" name="Straight Connector 188"/>
+            <p:cNvCxnSpPr/>
+            <p:nvPr/>
+          </p:nvCxnSpPr>
+          <p:spPr>
+            <a:xfrm>
+              <a:off x="6510673" y="3510159"/>
+              <a:ext cx="0" cy="175883"/>
+            </a:xfrm>
+            <a:prstGeom prst="line">
+              <a:avLst/>
+            </a:prstGeom>
+            <a:ln>
+              <a:solidFill>
+                <a:srgbClr val="7F7F7F"/>
+              </a:solidFill>
+            </a:ln>
+          </p:spPr>
+          <p:style>
+            <a:lnRef idx="1">
+              <a:schemeClr val="dk1"/>
+            </a:lnRef>
+            <a:fillRef idx="0">
+              <a:schemeClr val="dk1"/>
+            </a:fillRef>
+            <a:effectRef idx="0">
+              <a:schemeClr val="dk1"/>
+            </a:effectRef>
+            <a:fontRef idx="minor">
+              <a:schemeClr val="tx1"/>
+            </a:fontRef>
+          </p:style>
+        </p:cxnSp>
+        <p:cxnSp>
+          <p:nvCxnSpPr>
+            <p:cNvPr id="196" name="Straight Connector 195"/>
+            <p:cNvCxnSpPr>
+              <a:stCxn id="56" idx="2"/>
+            </p:cNvCxnSpPr>
+            <p:nvPr/>
+          </p:nvCxnSpPr>
+          <p:spPr>
+            <a:xfrm>
+              <a:off x="3301210" y="3333931"/>
+              <a:ext cx="2276" cy="173736"/>
+            </a:xfrm>
+            <a:prstGeom prst="line">
+              <a:avLst/>
+            </a:prstGeom>
+            <a:ln>
+              <a:solidFill>
+                <a:srgbClr val="7F7F7F"/>
+              </a:solidFill>
+            </a:ln>
+          </p:spPr>
+          <p:style>
+            <a:lnRef idx="1">
+              <a:schemeClr val="dk1"/>
+            </a:lnRef>
+            <a:fillRef idx="0">
+              <a:schemeClr val="dk1"/>
+            </a:fillRef>
+            <a:effectRef idx="0">
+              <a:schemeClr val="dk1"/>
+            </a:effectRef>
+            <a:fontRef idx="minor">
+              <a:schemeClr val="tx1"/>
+            </a:fontRef>
+          </p:style>
+        </p:cxnSp>
+        <p:sp>
+          <p:nvSpPr>
+            <p:cNvPr id="200" name="Rectangle 199"/>
+            <p:cNvSpPr/>
+            <p:nvPr/>
+          </p:nvSpPr>
+          <p:spPr>
+            <a:xfrm>
+              <a:off x="3139159" y="3686043"/>
+              <a:ext cx="649792" cy="229465"/>
+            </a:xfrm>
+            <a:prstGeom prst="rect">
+              <a:avLst/>
+            </a:prstGeom>
+            <a:solidFill>
+              <a:schemeClr val="bg1">
+                <a:lumMod val="95000"/>
+              </a:schemeClr>
+            </a:solidFill>
+            <a:ln w="12700" cmpd="sng">
               <a:solidFill>
                 <a:srgbClr val="2C74A5"/>
               </a:solidFill>
-              <a:latin typeface="Arial Narrow"/>
-              <a:cs typeface="Arial Narrow"/>
-            </a:endParaRPr>
-          </a:p>
-        </p:txBody>
-      </p:sp>
-      <p:sp>
-        <p:nvSpPr>
-          <p:cNvPr id="201" name="Rectangle 200"/>
-          <p:cNvSpPr/>
-          <p:nvPr/>
-        </p:nvSpPr>
-        <p:spPr>
-          <a:xfrm>
-            <a:off x="3878644" y="3686043"/>
-            <a:ext cx="722507" cy="229465"/>
-          </a:xfrm>
-          <a:prstGeom prst="rect">
-            <a:avLst/>
-          </a:prstGeom>
-          <a:solidFill>
-            <a:schemeClr val="bg1">
-              <a:lumMod val="95000"/>
-            </a:schemeClr>
-          </a:solidFill>
-          <a:ln w="12700" cmpd="sng">
-            <a:solidFill>
-              <a:srgbClr val="2C74A5"/>
-            </a:solidFill>
-          </a:ln>
-        </p:spPr>
-        <p:style>
-          <a:lnRef idx="2">
-            <a:schemeClr val="dk1"/>
-          </a:lnRef>
-          <a:fillRef idx="1">
-            <a:schemeClr val="lt1"/>
-          </a:fillRef>
-          <a:effectRef idx="0">
-            <a:schemeClr val="dk1"/>
-          </a:effectRef>
-          <a:fontRef idx="minor">
-            <a:schemeClr val="dk1"/>
-          </a:fontRef>
-        </p:style>
-        <p:txBody>
-          <a:bodyPr tIns="0" bIns="27432" rtlCol="0" anchor="ctr" anchorCtr="1"/>
-          <a:lstStyle/>
-          <a:p>
-            <a:pPr algn="ctr"/>
-            <a:r>
-              <a:rPr lang="en-US" sz="1200" b="1" dirty="0" smtClean="0">
+            </a:ln>
+          </p:spPr>
+          <p:style>
+            <a:lnRef idx="2">
+              <a:schemeClr val="dk1"/>
+            </a:lnRef>
+            <a:fillRef idx="1">
+              <a:schemeClr val="lt1"/>
+            </a:fillRef>
+            <a:effectRef idx="0">
+              <a:schemeClr val="dk1"/>
+            </a:effectRef>
+            <a:fontRef idx="minor">
+              <a:schemeClr val="dk1"/>
+            </a:fontRef>
+          </p:style>
+          <p:txBody>
+            <a:bodyPr tIns="0" bIns="27432" rtlCol="0" anchor="ctr" anchorCtr="1"/>
+            <a:lstStyle/>
+            <a:p>
+              <a:pPr algn="ctr"/>
+              <a:r>
+                <a:rPr lang="en-US" sz="1200" b="1" dirty="0" smtClean="0">
+                  <a:solidFill>
+                    <a:srgbClr val="2C74A5"/>
+                  </a:solidFill>
+                  <a:latin typeface="Arial Narrow"/>
+                  <a:cs typeface="Arial Narrow"/>
+                </a:rPr>
+                <a:t>cuisine</a:t>
+              </a:r>
+              <a:endParaRPr lang="en-US" sz="2000" b="1" dirty="0">
                 <a:solidFill>
                   <a:srgbClr val="2C74A5"/>
                 </a:solidFill>
                 <a:latin typeface="Arial Narrow"/>
                 <a:cs typeface="Arial Narrow"/>
-              </a:rPr>
-              <a:t>category</a:t>
-            </a:r>
-            <a:endParaRPr lang="en-US" sz="2000" b="1" dirty="0">
+              </a:endParaRPr>
+            </a:p>
+          </p:txBody>
+        </p:sp>
+        <p:sp>
+          <p:nvSpPr>
+            <p:cNvPr id="201" name="Rectangle 200"/>
+            <p:cNvSpPr/>
+            <p:nvPr/>
+          </p:nvSpPr>
+          <p:spPr>
+            <a:xfrm>
+              <a:off x="3878644" y="3686043"/>
+              <a:ext cx="722507" cy="229465"/>
+            </a:xfrm>
+            <a:prstGeom prst="rect">
+              <a:avLst/>
+            </a:prstGeom>
+            <a:solidFill>
+              <a:schemeClr val="bg1">
+                <a:lumMod val="95000"/>
+              </a:schemeClr>
+            </a:solidFill>
+            <a:ln w="12700" cmpd="sng">
               <a:solidFill>
                 <a:srgbClr val="2C74A5"/>
               </a:solidFill>
-              <a:latin typeface="Arial Narrow"/>
-              <a:cs typeface="Arial Narrow"/>
-            </a:endParaRPr>
-          </a:p>
-        </p:txBody>
-      </p:sp>
-      <p:cxnSp>
-        <p:nvCxnSpPr>
-          <p:cNvPr id="202" name="Straight Connector 201"/>
-          <p:cNvCxnSpPr>
-            <a:endCxn id="201" idx="0"/>
-          </p:cNvCxnSpPr>
-          <p:nvPr/>
-        </p:nvCxnSpPr>
-        <p:spPr>
-          <a:xfrm>
-            <a:off x="4238590" y="3507667"/>
-            <a:ext cx="1308" cy="178376"/>
-          </a:xfrm>
-          <a:prstGeom prst="line">
-            <a:avLst/>
-          </a:prstGeom>
-          <a:ln>
-            <a:solidFill>
-              <a:srgbClr val="7F7F7F"/>
-            </a:solidFill>
-          </a:ln>
-        </p:spPr>
-        <p:style>
-          <a:lnRef idx="1">
-            <a:schemeClr val="dk1"/>
-          </a:lnRef>
-          <a:fillRef idx="0">
-            <a:schemeClr val="dk1"/>
-          </a:fillRef>
-          <a:effectRef idx="0">
-            <a:schemeClr val="dk1"/>
-          </a:effectRef>
-          <a:fontRef idx="minor">
-            <a:schemeClr val="tx1"/>
-          </a:fontRef>
-        </p:style>
-      </p:cxnSp>
-      <p:cxnSp>
-        <p:nvCxnSpPr>
-          <p:cNvPr id="205" name="Straight Connector 204"/>
-          <p:cNvCxnSpPr>
-            <a:endCxn id="200" idx="0"/>
-          </p:cNvCxnSpPr>
-          <p:nvPr/>
-        </p:nvCxnSpPr>
-        <p:spPr>
-          <a:xfrm>
-            <a:off x="3464055" y="3514648"/>
-            <a:ext cx="0" cy="171395"/>
-          </a:xfrm>
-          <a:prstGeom prst="line">
-            <a:avLst/>
-          </a:prstGeom>
-          <a:ln>
-            <a:solidFill>
-              <a:srgbClr val="7F7F7F"/>
-            </a:solidFill>
-          </a:ln>
-        </p:spPr>
-        <p:style>
-          <a:lnRef idx="1">
-            <a:schemeClr val="dk1"/>
-          </a:lnRef>
-          <a:fillRef idx="0">
-            <a:schemeClr val="dk1"/>
-          </a:fillRef>
-          <a:effectRef idx="0">
-            <a:schemeClr val="dk1"/>
-          </a:effectRef>
-          <a:fontRef idx="minor">
-            <a:schemeClr val="tx1"/>
-          </a:fontRef>
-        </p:style>
-      </p:cxnSp>
+            </a:ln>
+          </p:spPr>
+          <p:style>
+            <a:lnRef idx="2">
+              <a:schemeClr val="dk1"/>
+            </a:lnRef>
+            <a:fillRef idx="1">
+              <a:schemeClr val="lt1"/>
+            </a:fillRef>
+            <a:effectRef idx="0">
+              <a:schemeClr val="dk1"/>
+            </a:effectRef>
+            <a:fontRef idx="minor">
+              <a:schemeClr val="dk1"/>
+            </a:fontRef>
+          </p:style>
+          <p:txBody>
+            <a:bodyPr tIns="0" bIns="27432" rtlCol="0" anchor="ctr" anchorCtr="1"/>
+            <a:lstStyle/>
+            <a:p>
+              <a:pPr algn="ctr"/>
+              <a:r>
+                <a:rPr lang="en-US" sz="1200" b="1" dirty="0" smtClean="0">
+                  <a:solidFill>
+                    <a:srgbClr val="2C74A5"/>
+                  </a:solidFill>
+                  <a:latin typeface="Arial Narrow"/>
+                  <a:cs typeface="Arial Narrow"/>
+                </a:rPr>
+                <a:t>category</a:t>
+              </a:r>
+              <a:endParaRPr lang="en-US" sz="2000" b="1" dirty="0">
+                <a:solidFill>
+                  <a:srgbClr val="2C74A5"/>
+                </a:solidFill>
+                <a:latin typeface="Arial Narrow"/>
+                <a:cs typeface="Arial Narrow"/>
+              </a:endParaRPr>
+            </a:p>
+          </p:txBody>
+        </p:sp>
+        <p:cxnSp>
+          <p:nvCxnSpPr>
+            <p:cNvPr id="202" name="Straight Connector 201"/>
+            <p:cNvCxnSpPr>
+              <a:endCxn id="201" idx="0"/>
+            </p:cNvCxnSpPr>
+            <p:nvPr/>
+          </p:nvCxnSpPr>
+          <p:spPr>
+            <a:xfrm>
+              <a:off x="4238590" y="3507667"/>
+              <a:ext cx="1308" cy="178376"/>
+            </a:xfrm>
+            <a:prstGeom prst="line">
+              <a:avLst/>
+            </a:prstGeom>
+            <a:ln>
+              <a:solidFill>
+                <a:srgbClr val="7F7F7F"/>
+              </a:solidFill>
+            </a:ln>
+          </p:spPr>
+          <p:style>
+            <a:lnRef idx="1">
+              <a:schemeClr val="dk1"/>
+            </a:lnRef>
+            <a:fillRef idx="0">
+              <a:schemeClr val="dk1"/>
+            </a:fillRef>
+            <a:effectRef idx="0">
+              <a:schemeClr val="dk1"/>
+            </a:effectRef>
+            <a:fontRef idx="minor">
+              <a:schemeClr val="tx1"/>
+            </a:fontRef>
+          </p:style>
+        </p:cxnSp>
+        <p:cxnSp>
+          <p:nvCxnSpPr>
+            <p:cNvPr id="205" name="Straight Connector 204"/>
+            <p:cNvCxnSpPr>
+              <a:endCxn id="200" idx="0"/>
+            </p:cNvCxnSpPr>
+            <p:nvPr/>
+          </p:nvCxnSpPr>
+          <p:spPr>
+            <a:xfrm>
+              <a:off x="3464055" y="3514648"/>
+              <a:ext cx="0" cy="171395"/>
+            </a:xfrm>
+            <a:prstGeom prst="line">
+              <a:avLst/>
+            </a:prstGeom>
+            <a:ln>
+              <a:solidFill>
+                <a:srgbClr val="7F7F7F"/>
+              </a:solidFill>
+            </a:ln>
+          </p:spPr>
+          <p:style>
+            <a:lnRef idx="1">
+              <a:schemeClr val="dk1"/>
+            </a:lnRef>
+            <a:fillRef idx="0">
+              <a:schemeClr val="dk1"/>
+            </a:fillRef>
+            <a:effectRef idx="0">
+              <a:schemeClr val="dk1"/>
+            </a:effectRef>
+            <a:fontRef idx="minor">
+              <a:schemeClr val="tx1"/>
+            </a:fontRef>
+          </p:style>
+        </p:cxnSp>
+      </p:grpSp>
     </p:spTree>
     <p:extLst>
       <p:ext uri="{BB962C8B-B14F-4D97-AF65-F5344CB8AC3E}">

</xml_diff>

<commit_message>
updated food ordering examples
</commit_message>
<xml_diff>
--- a/docs/source/images/images.pptx
+++ b/docs/source/images/images.pptx
@@ -225,7 +225,7 @@
           <a:p>
             <a:fld id="{C06C16C2-E84F-C94A-BAEB-BD9A80415D2E}" type="datetimeFigureOut">
               <a:rPr lang="en-US" smtClean="0"/>
-              <a:t>7/17/17</a:t>
+              <a:t>7/24/17</a:t>
             </a:fld>
             <a:endParaRPr lang="en-US"/>
           </a:p>
@@ -1419,7 +1419,7 @@
           <a:p>
             <a:fld id="{85FD3787-7239-C647-8F46-4AEF603A44BF}" type="datetime1">
               <a:rPr lang="en-US" smtClean="0"/>
-              <a:t>7/17/17</a:t>
+              <a:t>7/24/17</a:t>
             </a:fld>
             <a:endParaRPr lang="en-US" dirty="0"/>
           </a:p>
@@ -1589,7 +1589,7 @@
           <a:p>
             <a:fld id="{58F06498-C7BA-7B4F-A289-96E741DB6F51}" type="datetime1">
               <a:rPr lang="en-US" smtClean="0"/>
-              <a:t>7/17/17</a:t>
+              <a:t>7/24/17</a:t>
             </a:fld>
             <a:endParaRPr lang="en-US" dirty="0"/>
           </a:p>
@@ -1769,7 +1769,7 @@
           <a:p>
             <a:fld id="{92B56630-3C53-6E41-8F36-B5B7DC677D8C}" type="datetime1">
               <a:rPr lang="en-US" smtClean="0"/>
-              <a:t>7/17/17</a:t>
+              <a:t>7/24/17</a:t>
             </a:fld>
             <a:endParaRPr lang="en-US" dirty="0"/>
           </a:p>
@@ -1939,7 +1939,7 @@
           <a:p>
             <a:fld id="{AB3D54BB-4E0B-844F-968F-93A99D2A0E27}" type="datetime1">
               <a:rPr lang="en-US" smtClean="0"/>
-              <a:t>7/17/17</a:t>
+              <a:t>7/24/17</a:t>
             </a:fld>
             <a:endParaRPr lang="en-US" dirty="0"/>
           </a:p>
@@ -2185,7 +2185,7 @@
           <a:p>
             <a:fld id="{8308F5C4-D4BE-1246-89B0-2CF09E5A1C73}" type="datetime1">
               <a:rPr lang="en-US" smtClean="0"/>
-              <a:t>7/17/17</a:t>
+              <a:t>7/24/17</a:t>
             </a:fld>
             <a:endParaRPr lang="en-US" dirty="0"/>
           </a:p>
@@ -2473,7 +2473,7 @@
           <a:p>
             <a:fld id="{AE2C759A-60C1-D347-A2FC-BD124BE24608}" type="datetime1">
               <a:rPr lang="en-US" smtClean="0"/>
-              <a:t>7/17/17</a:t>
+              <a:t>7/24/17</a:t>
             </a:fld>
             <a:endParaRPr lang="en-US" dirty="0"/>
           </a:p>
@@ -2895,7 +2895,7 @@
           <a:p>
             <a:fld id="{81A1B11B-E3A3-7242-9E6D-08D8E0DF02D1}" type="datetime1">
               <a:rPr lang="en-US" smtClean="0"/>
-              <a:t>7/17/17</a:t>
+              <a:t>7/24/17</a:t>
             </a:fld>
             <a:endParaRPr lang="en-US" dirty="0"/>
           </a:p>
@@ -3013,7 +3013,7 @@
           <a:p>
             <a:fld id="{4BD03965-1CEF-054A-A931-4796ABBAFB43}" type="datetime1">
               <a:rPr lang="en-US" smtClean="0"/>
-              <a:t>7/17/17</a:t>
+              <a:t>7/24/17</a:t>
             </a:fld>
             <a:endParaRPr lang="en-US" dirty="0"/>
           </a:p>
@@ -3108,7 +3108,7 @@
           <a:p>
             <a:fld id="{B2AA7C06-6D5E-494B-9BF1-9BBBE1D5A1C7}" type="datetime1">
               <a:rPr lang="en-US" smtClean="0"/>
-              <a:t>7/17/17</a:t>
+              <a:t>7/24/17</a:t>
             </a:fld>
             <a:endParaRPr lang="en-US" dirty="0"/>
           </a:p>
@@ -3385,7 +3385,7 @@
           <a:p>
             <a:fld id="{7CE04B88-50CE-7A45-AE26-A9751D882E6D}" type="datetime1">
               <a:rPr lang="en-US" smtClean="0"/>
-              <a:t>7/17/17</a:t>
+              <a:t>7/24/17</a:t>
             </a:fld>
             <a:endParaRPr lang="en-US" dirty="0"/>
           </a:p>
@@ -3642,7 +3642,7 @@
           <a:p>
             <a:fld id="{70B692A8-8BCF-2745-A1F3-24034345F60C}" type="datetime1">
               <a:rPr lang="en-US" smtClean="0"/>
-              <a:t>7/17/17</a:t>
+              <a:t>7/24/17</a:t>
             </a:fld>
             <a:endParaRPr lang="en-US" dirty="0"/>
           </a:p>
@@ -3856,7 +3856,7 @@
             <a:fld id="{B994E09A-36F1-0A45-80F7-B10DE6908129}" type="datetime1">
               <a:rPr lang="en-US" smtClean="0"/>
               <a:pPr/>
-              <a:t>7/17/17</a:t>
+              <a:t>7/24/17</a:t>
             </a:fld>
             <a:endParaRPr lang="en-US" dirty="0"/>
           </a:p>
@@ -27434,48 +27434,60 @@
           <a:lstStyle/>
           <a:p>
             <a:r>
-              <a:rPr lang="en-US" sz="900" dirty="0" smtClean="0"/>
-              <a:t>Ok, I got the </a:t>
+              <a:rPr lang="en-US" sz="900" dirty="0"/>
+              <a:t>Sure, I have 2 orders of </a:t>
+            </a:r>
+            <a:r>
+              <a:rPr lang="en-US" sz="900" b="1" dirty="0"/>
+              <a:t>Pepperoni Pizza</a:t>
+            </a:r>
+            <a:r>
+              <a:rPr lang="en-US" sz="900" dirty="0"/>
+              <a:t>, 1 order of </a:t>
+            </a:r>
+            <a:r>
+              <a:rPr lang="en-US" sz="900" b="1" dirty="0"/>
+              <a:t>Vegetarian Pizza</a:t>
+            </a:r>
+            <a:r>
+              <a:rPr lang="en-US" sz="900" dirty="0"/>
+              <a:t>, and 1 order of </a:t>
             </a:r>
             <a:r>
               <a:rPr lang="en-US" sz="900" b="1" dirty="0" smtClean="0"/>
-              <a:t>Saag Paneer </a:t>
+              <a:t>House Salad</a:t>
             </a:r>
             <a:r>
               <a:rPr lang="en-US" sz="900" dirty="0" smtClean="0"/>
-              <a:t>with a side of </a:t>
+              <a:t> </a:t>
+            </a:r>
+            <a:r>
+              <a:rPr lang="en-US" sz="900" dirty="0"/>
+              <a:t>from </a:t>
+            </a:r>
+            <a:r>
+              <a:rPr lang="en-US" sz="900" b="1" dirty="0" err="1"/>
+              <a:t>Firetrail</a:t>
+            </a:r>
+            <a:r>
+              <a:rPr lang="en-US" sz="900" b="1" dirty="0"/>
+              <a:t> Pizza </a:t>
+            </a:r>
+            <a:r>
+              <a:rPr lang="en-US" sz="900" dirty="0"/>
+              <a:t>for a total price of </a:t>
             </a:r>
             <a:r>
               <a:rPr lang="en-US" sz="900" b="1" dirty="0" smtClean="0"/>
-              <a:t>Peas Pulav and Raita </a:t>
+              <a:t>$41.99</a:t>
             </a:r>
             <a:r>
               <a:rPr lang="en-US" sz="900" dirty="0" smtClean="0"/>
-              <a:t>and a </a:t>
+              <a:t>. </a:t>
             </a:r>
             <a:r>
-              <a:rPr lang="en-US" sz="900" b="1" dirty="0" smtClean="0"/>
-              <a:t>Garlic Naan </a:t>
-            </a:r>
-            <a:r>
-              <a:rPr lang="en-US" sz="900" dirty="0" smtClean="0"/>
-              <a:t>from </a:t>
-            </a:r>
-            <a:r>
-              <a:rPr lang="en-US" sz="900" b="1" dirty="0" smtClean="0"/>
-              <a:t>Little India </a:t>
-            </a:r>
-            <a:r>
-              <a:rPr lang="en-US" sz="900" dirty="0" smtClean="0"/>
-              <a:t>for a total price of</a:t>
-            </a:r>
-            <a:r>
-              <a:rPr lang="en-US" sz="900" b="1" dirty="0" smtClean="0"/>
-              <a:t> $14.75.</a:t>
-            </a:r>
-            <a:r>
-              <a:rPr lang="en-US" sz="900" dirty="0" smtClean="0"/>
-              <a:t> Would you like to place the order?</a:t>
+              <a:rPr lang="en-US" sz="900" dirty="0"/>
+              <a:t>Would you like to place the order?</a:t>
             </a:r>
             <a:endParaRPr lang="en-US" sz="900" b="1" dirty="0"/>
           </a:p>
@@ -27536,8 +27548,16 @@
               <a:t>Great, what can I get you from </a:t>
             </a:r>
             <a:r>
+              <a:rPr lang="en-US" sz="900" b="1" dirty="0" err="1" smtClean="0"/>
+              <a:t>Firetrail</a:t>
+            </a:r>
+            <a:r>
               <a:rPr lang="en-US" sz="900" b="1" dirty="0" smtClean="0"/>
-              <a:t>Little India?</a:t>
+              <a:t> Pizza</a:t>
+            </a:r>
+            <a:r>
+              <a:rPr lang="en-US" sz="900" b="1" dirty="0" smtClean="0"/>
+              <a:t>?</a:t>
             </a:r>
             <a:endParaRPr lang="en-US" sz="900" dirty="0"/>
           </a:p>
@@ -27602,15 +27622,7 @@
                   <a:srgbClr val="FFFFFF"/>
                 </a:solidFill>
               </a:rPr>
-              <a:t>I want Saag Paneer with Peas Pulav, cucumber raita and one garlic </a:t>
-            </a:r>
-            <a:r>
-              <a:rPr lang="en-US" sz="900" dirty="0" smtClean="0">
-                <a:solidFill>
-                  <a:srgbClr val="FFFFFF"/>
-                </a:solidFill>
-              </a:rPr>
-              <a:t>naan.</a:t>
+              <a:t>I want two pepperoni pizzas, one veggie pizza and some house salad.</a:t>
             </a:r>
             <a:endParaRPr lang="en-US" sz="900" dirty="0">
               <a:solidFill>
@@ -27676,23 +27688,32 @@
                   <a:srgbClr val="FFFFFF"/>
                 </a:solidFill>
               </a:rPr>
-              <a:t>How about </a:t>
+              <a:t>How </a:t>
             </a:r>
             <a:r>
-              <a:rPr lang="en-US" sz="900" smtClean="0">
+              <a:rPr lang="en-US" sz="900" dirty="0" smtClean="0">
                 <a:solidFill>
                   <a:srgbClr val="FFFFFF"/>
                 </a:solidFill>
               </a:rPr>
-              <a:t>Little India?</a:t>
+              <a:t>about </a:t>
             </a:r>
-            <a:endParaRPr lang="en-US" sz="900" dirty="0" smtClean="0">
-              <a:solidFill>
-                <a:srgbClr val="FFFFFF"/>
-              </a:solidFill>
-            </a:endParaRPr>
-          </a:p>
-          <a:p>
+            <a:r>
+              <a:rPr lang="en-US" sz="900" dirty="0" err="1" smtClean="0">
+                <a:solidFill>
+                  <a:srgbClr val="FFFFFF"/>
+                </a:solidFill>
+              </a:rPr>
+              <a:t>Firetrail</a:t>
+            </a:r>
+            <a:r>
+              <a:rPr lang="en-US" sz="900" dirty="0" smtClean="0">
+                <a:solidFill>
+                  <a:srgbClr val="FFFFFF"/>
+                </a:solidFill>
+              </a:rPr>
+              <a:t>?</a:t>
+            </a:r>
             <a:endParaRPr lang="en-US" sz="900" dirty="0">
               <a:solidFill>
                 <a:srgbClr val="FFFFFF"/>
@@ -27759,40 +27780,48 @@
           <a:lstStyle/>
           <a:p>
             <a:r>
-              <a:rPr lang="en-US" sz="900" dirty="0" smtClean="0"/>
+              <a:rPr lang="en-US" sz="900" dirty="0"/>
               <a:t>I found </a:t>
             </a:r>
             <a:r>
-              <a:rPr lang="en-US" sz="900" b="1" dirty="0" smtClean="0"/>
-              <a:t>Garlic Naan </a:t>
+              <a:rPr lang="en-US" sz="900" b="1" dirty="0"/>
+              <a:t>pizza</a:t>
             </a:r>
             <a:r>
-              <a:rPr lang="en-US" sz="900" dirty="0" smtClean="0"/>
-              <a:t>at </a:t>
+              <a:rPr lang="en-US" sz="900" dirty="0"/>
+              <a:t> at </a:t>
             </a:r>
             <a:r>
-              <a:rPr lang="en-US" sz="900" b="1" dirty="0" smtClean="0"/>
-              <a:t>Punjab Kabab House</a:t>
+              <a:rPr lang="en-US" sz="900" b="1" dirty="0"/>
+              <a:t>Extreme Pizza, </a:t>
             </a:r>
             <a:r>
-              <a:rPr lang="en-US" sz="900" dirty="0" smtClean="0"/>
+              <a:rPr lang="en-US" sz="900" b="1" dirty="0" err="1"/>
+              <a:t>Buca</a:t>
+            </a:r>
+            <a:r>
+              <a:rPr lang="en-US" sz="900" b="1" dirty="0"/>
+              <a:t> Di </a:t>
+            </a:r>
+            <a:r>
+              <a:rPr lang="en-US" sz="900" b="1" dirty="0" err="1"/>
+              <a:t>Beppo</a:t>
+            </a:r>
+            <a:r>
+              <a:rPr lang="en-US" sz="900" dirty="0"/>
               <a:t>, </a:t>
             </a:r>
             <a:r>
-              <a:rPr lang="en-US" sz="900" b="1" dirty="0" smtClean="0"/>
-              <a:t>Little India </a:t>
+              <a:rPr lang="en-US" sz="900" b="1" dirty="0" err="1"/>
+              <a:t>Firetrail</a:t>
             </a:r>
             <a:r>
-              <a:rPr lang="en-US" sz="900" dirty="0" smtClean="0"/>
-              <a:t>and </a:t>
+              <a:rPr lang="en-US" sz="900" b="1" dirty="0"/>
+              <a:t> Pizza</a:t>
             </a:r>
             <a:r>
-              <a:rPr lang="en-US" sz="900" b="1" dirty="0" smtClean="0"/>
-              <a:t>Urban Curry. </a:t>
-            </a:r>
-            <a:r>
-              <a:rPr lang="en-US" sz="900" dirty="0" smtClean="0"/>
-              <a:t>Which one would you like to order form?</a:t>
+              <a:rPr lang="en-US" sz="900" dirty="0"/>
+              <a:t>. Where would you like to order from?</a:t>
             </a:r>
             <a:endParaRPr lang="en-US" sz="900" dirty="0"/>
           </a:p>
@@ -27854,8 +27883,21 @@
                   <a:srgbClr val="FFFFFF"/>
                 </a:solidFill>
               </a:rPr>
-              <a:t>What are some good places that have garlic naan?</a:t>
+              <a:t>What are some good places </a:t>
             </a:r>
+            <a:r>
+              <a:rPr lang="en-US" sz="900" dirty="0" smtClean="0">
+                <a:solidFill>
+                  <a:srgbClr val="FFFFFF"/>
+                </a:solidFill>
+              </a:rPr>
+              <a:t>that have pizza on the menu?</a:t>
+            </a:r>
+            <a:endParaRPr lang="en-US" sz="900" dirty="0" smtClean="0">
+              <a:solidFill>
+                <a:srgbClr val="FFFFFF"/>
+              </a:solidFill>
+            </a:endParaRPr>
           </a:p>
           <a:p>
             <a:endParaRPr lang="en-US" sz="900" dirty="0">
@@ -27929,7 +27971,15 @@
                   <a:srgbClr val="FFFFFF"/>
                 </a:solidFill>
               </a:rPr>
-              <a:t>Could you also add a mango lassi to my order?</a:t>
+              <a:t>Could </a:t>
+            </a:r>
+            <a:r>
+              <a:rPr lang="en-US" sz="900" dirty="0" smtClean="0">
+                <a:solidFill>
+                  <a:srgbClr val="FFFFFF"/>
+                </a:solidFill>
+              </a:rPr>
+              <a:t>you add another house salad to my order?</a:t>
             </a:r>
             <a:endParaRPr lang="en-US" sz="900" dirty="0">
               <a:solidFill>
@@ -27995,27 +28045,51 @@
             </a:r>
             <a:r>
               <a:rPr lang="en-US" sz="900" b="1" dirty="0" smtClean="0"/>
-              <a:t>Mango Lassi </a:t>
+              <a:t>House Salad </a:t>
             </a:r>
             <a:r>
               <a:rPr lang="en-US" sz="900" dirty="0" smtClean="0"/>
-              <a:t>to your order from </a:t>
+              <a:t>to </a:t>
+            </a:r>
+            <a:r>
+              <a:rPr lang="en-US" sz="900" dirty="0" smtClean="0"/>
+              <a:t>your order </a:t>
+            </a:r>
+            <a:r>
+              <a:rPr lang="en-US" sz="900" dirty="0" smtClean="0"/>
+              <a:t>from </a:t>
+            </a:r>
+            <a:r>
+              <a:rPr lang="en-US" sz="900" b="1" dirty="0" err="1" smtClean="0"/>
+              <a:t>Firetrail</a:t>
             </a:r>
             <a:r>
               <a:rPr lang="en-US" sz="900" b="1" dirty="0" smtClean="0"/>
-              <a:t>Little India</a:t>
+              <a:t> Pizza</a:t>
             </a:r>
             <a:r>
               <a:rPr lang="en-US" sz="900" dirty="0" smtClean="0"/>
-              <a:t>. The total price is now </a:t>
+              <a:t>. </a:t>
+            </a:r>
+            <a:r>
+              <a:rPr lang="en-US" sz="900" dirty="0" smtClean="0"/>
+              <a:t>The total price is now </a:t>
+            </a:r>
+            <a:r>
+              <a:rPr lang="en-US" sz="900" b="1" dirty="0"/>
+              <a:t>$48.98</a:t>
             </a:r>
             <a:r>
               <a:rPr lang="en-US" sz="900" b="1" dirty="0" smtClean="0"/>
-              <a:t>$17.75.</a:t>
+              <a:t>.</a:t>
             </a:r>
             <a:r>
               <a:rPr lang="en-US" sz="900" dirty="0" smtClean="0"/>
-              <a:t> Would you like to place the order?</a:t>
+              <a:t> </a:t>
+            </a:r>
+            <a:r>
+              <a:rPr lang="en-US" sz="900" dirty="0" smtClean="0"/>
+              <a:t>Would you like to place the order?</a:t>
             </a:r>
             <a:endParaRPr lang="en-US" sz="900" b="1" dirty="0"/>
           </a:p>
@@ -28076,8 +28150,16 @@
               <a:t>Great, your order from </a:t>
             </a:r>
             <a:r>
+              <a:rPr lang="en-US" sz="900" b="1" dirty="0" err="1" smtClean="0"/>
+              <a:t>Firetrail</a:t>
+            </a:r>
+            <a:r>
               <a:rPr lang="en-US" sz="900" b="1" dirty="0" smtClean="0"/>
-              <a:t>Little India </a:t>
+              <a:t> Pizz</a:t>
+            </a:r>
+            <a:r>
+              <a:rPr lang="en-US" sz="900" b="1" dirty="0" smtClean="0"/>
+              <a:t>a </a:t>
             </a:r>
             <a:r>
               <a:rPr lang="en-US" sz="900" dirty="0" smtClean="0"/>
@@ -28221,58 +28303,42 @@
           <a:lstStyle/>
           <a:p>
             <a:r>
-              <a:rPr lang="en-US" sz="900" dirty="0" smtClean="0"/>
-              <a:t>Sure, I got the </a:t>
+              <a:rPr lang="en-US" sz="900" dirty="0"/>
+              <a:t>Sure, I have 1 order of </a:t>
+            </a:r>
+            <a:r>
+              <a:rPr lang="en-US" sz="900" b="1" dirty="0"/>
+              <a:t>Caesar Salad </a:t>
+            </a:r>
+            <a:r>
+              <a:rPr lang="en-US" sz="900" dirty="0"/>
+              <a:t>and 1 order of </a:t>
             </a:r>
             <a:r>
               <a:rPr lang="en-US" sz="900" b="1" dirty="0" smtClean="0"/>
-              <a:t>Grilled Chicken Sandwich </a:t>
+              <a:t>Veggie Wrap </a:t>
             </a:r>
             <a:r>
               <a:rPr lang="en-US" sz="900" dirty="0" smtClean="0"/>
-              <a:t>on </a:t>
-            </a:r>
-            <a:r>
-              <a:rPr lang="en-US" sz="900" b="1" dirty="0"/>
-              <a:t>s</a:t>
-            </a:r>
-            <a:r>
-              <a:rPr lang="en-US" sz="900" b="1" dirty="0" smtClean="0"/>
-              <a:t>ourdough </a:t>
-            </a:r>
-            <a:r>
-              <a:rPr lang="en-US" sz="900" b="1" dirty="0"/>
-              <a:t>b</a:t>
-            </a:r>
-            <a:r>
-              <a:rPr lang="en-US" sz="900" b="1" dirty="0" smtClean="0"/>
-              <a:t>read </a:t>
-            </a:r>
-            <a:r>
-              <a:rPr lang="en-US" sz="900" dirty="0"/>
               <a:t>from </a:t>
             </a:r>
             <a:r>
               <a:rPr lang="en-US" sz="900" b="1" dirty="0"/>
-              <a:t>Sam's Sandwiches &amp; </a:t>
+              <a:t>The Salad Place </a:t>
             </a:r>
             <a:r>
-              <a:rPr lang="en-US" sz="900" b="1" dirty="0" smtClean="0"/>
-              <a:t>Coffee </a:t>
+              <a:rPr lang="en-US" sz="900" dirty="0"/>
+              <a:t>for a total price of </a:t>
             </a:r>
             <a:r>
-              <a:rPr lang="en-US" sz="900" dirty="0" smtClean="0"/>
-              <a:t>for a total price of</a:t>
+              <a:rPr lang="en-US" sz="900" b="1" dirty="0"/>
+              <a:t>$17.90</a:t>
             </a:r>
             <a:r>
-              <a:rPr lang="en-US" sz="900" b="1" dirty="0" smtClean="0"/>
-              <a:t> $5.95</a:t>
-            </a:r>
-            <a:r>
-              <a:rPr lang="en-US" sz="900" dirty="0" smtClean="0"/>
+              <a:rPr lang="en-US" sz="900" dirty="0"/>
               <a:t>. Would you like to place the order?</a:t>
             </a:r>
-            <a:endParaRPr lang="en-US" sz="900" b="1" dirty="0"/>
+            <a:endParaRPr lang="en-US" sz="900" dirty="0" smtClean="0"/>
           </a:p>
         </p:txBody>
       </p:sp>
@@ -28348,7 +28414,23 @@
             </a:r>
             <a:r>
               <a:rPr lang="en-US" sz="900" dirty="0" smtClean="0"/>
-              <a:t>Palmyra, Boulevard Cafe and Sallys.</a:t>
+              <a:t>Palmyra, </a:t>
+            </a:r>
+            <a:r>
+              <a:rPr lang="en-US" sz="900" dirty="0"/>
+              <a:t>Grandma's Deli &amp; </a:t>
+            </a:r>
+            <a:r>
+              <a:rPr lang="en-US" sz="900" dirty="0" smtClean="0"/>
+              <a:t>Café </a:t>
+            </a:r>
+            <a:r>
+              <a:rPr lang="en-US" sz="900" dirty="0" smtClean="0"/>
+              <a:t>and </a:t>
+            </a:r>
+            <a:r>
+              <a:rPr lang="en-US" sz="900" dirty="0" smtClean="0"/>
+              <a:t>Sallys.</a:t>
             </a:r>
             <a:endParaRPr lang="en-US" sz="900" dirty="0"/>
           </a:p>
@@ -28413,7 +28495,23 @@
                   <a:srgbClr val="FFFFFF"/>
                 </a:solidFill>
               </a:rPr>
-              <a:t>I </a:t>
+              <a:t>I would like a </a:t>
+            </a:r>
+            <a:r>
+              <a:rPr lang="en-US" sz="900" dirty="0" err="1">
+                <a:solidFill>
+                  <a:srgbClr val="FFFFFF"/>
+                </a:solidFill>
+              </a:rPr>
+              <a:t>ceasar</a:t>
+            </a:r>
+            <a:r>
+              <a:rPr lang="en-US" sz="900" dirty="0">
+                <a:solidFill>
+                  <a:srgbClr val="FFFFFF"/>
+                </a:solidFill>
+              </a:rPr>
+              <a:t> salad and a veggie wrap from t</a:t>
             </a:r>
             <a:r>
               <a:rPr lang="en-US" sz="900" dirty="0" smtClean="0">
@@ -28421,7 +28519,7 @@
                   <a:srgbClr val="FFFFFF"/>
                 </a:solidFill>
               </a:rPr>
-              <a:t>would like a </a:t>
+              <a:t>he </a:t>
             </a:r>
             <a:r>
               <a:rPr lang="en-US" sz="900" dirty="0">
@@ -28429,7 +28527,7 @@
                   <a:srgbClr val="FFFFFF"/>
                 </a:solidFill>
               </a:rPr>
-              <a:t>grilled chicken sandwich with sourdough </a:t>
+              <a:t>s</a:t>
             </a:r>
             <a:r>
               <a:rPr lang="en-US" sz="900" dirty="0" smtClean="0">
@@ -28437,7 +28535,7 @@
                   <a:srgbClr val="FFFFFF"/>
                 </a:solidFill>
               </a:rPr>
-              <a:t>from </a:t>
+              <a:t>alad </a:t>
             </a:r>
             <a:r>
               <a:rPr lang="en-US" sz="900" dirty="0">
@@ -28445,8 +28543,21 @@
                   <a:srgbClr val="FFFFFF"/>
                 </a:solidFill>
               </a:rPr>
-              <a:t>Sams.</a:t>
+              <a:t>p</a:t>
             </a:r>
+            <a:r>
+              <a:rPr lang="en-US" sz="900" dirty="0" smtClean="0">
+                <a:solidFill>
+                  <a:srgbClr val="FFFFFF"/>
+                </a:solidFill>
+              </a:rPr>
+              <a:t>lace.</a:t>
+            </a:r>
+            <a:endParaRPr lang="en-US" sz="900" dirty="0">
+              <a:solidFill>
+                <a:srgbClr val="FFFFFF"/>
+              </a:solidFill>
+            </a:endParaRPr>
           </a:p>
         </p:txBody>
       </p:sp>
@@ -28588,12 +28699,16 @@
               <a:t>Great, your order from </a:t>
             </a:r>
             <a:r>
-              <a:rPr lang="en-US" sz="900" b="1" dirty="0" smtClean="0"/>
-              <a:t>Sam’s Sandwiches &amp; Coffee</a:t>
+              <a:rPr lang="en-US" sz="900" b="1" dirty="0"/>
+              <a:t>The Salad Place</a:t>
             </a:r>
             <a:r>
               <a:rPr lang="en-US" sz="900" dirty="0" smtClean="0"/>
-              <a:t> will </a:t>
+              <a:t> </a:t>
+            </a:r>
+            <a:r>
+              <a:rPr lang="en-US" sz="900" dirty="0" smtClean="0"/>
+              <a:t>will </a:t>
             </a:r>
             <a:r>
               <a:rPr lang="en-US" sz="900" dirty="0"/>
@@ -28974,11 +29089,6 @@
               </a:rPr>
               <a:t>do you have romantic movies?</a:t>
             </a:r>
-            <a:endParaRPr lang="en-US" sz="900" dirty="0">
-              <a:solidFill>
-                <a:srgbClr val="FFFFFF"/>
-              </a:solidFill>
-            </a:endParaRPr>
           </a:p>
           <a:p>
             <a:endParaRPr lang="en-US" sz="900" dirty="0">
@@ -29109,7 +29219,6 @@
               <a:rPr lang="en-US" sz="900" dirty="0"/>
               <a:t>.</a:t>
             </a:r>
-            <a:endParaRPr lang="en-US" sz="900" dirty="0"/>
           </a:p>
         </p:txBody>
       </p:sp>
@@ -29171,11 +29280,6 @@
               </a:rPr>
               <a:t>Find Tom Hanks movies</a:t>
             </a:r>
-            <a:endParaRPr lang="en-US" sz="900" dirty="0">
-              <a:solidFill>
-                <a:srgbClr val="FFFFFF"/>
-              </a:solidFill>
-            </a:endParaRPr>
           </a:p>
         </p:txBody>
       </p:sp>
@@ -29316,7 +29420,6 @@
               <a:rPr lang="en-US" sz="900" dirty="0"/>
               <a:t>See you later.</a:t>
             </a:r>
-            <a:endParaRPr lang="en-US" sz="900" dirty="0"/>
           </a:p>
         </p:txBody>
       </p:sp>
@@ -29744,7 +29847,6 @@
               <a:rPr lang="en-US" sz="900" b="1" dirty="0"/>
               <a:t>Beauty and the Beast</a:t>
             </a:r>
-            <a:endParaRPr lang="en-US" sz="900" b="1" dirty="0"/>
           </a:p>
         </p:txBody>
       </p:sp>
@@ -29803,7 +29905,6 @@
               <a:rPr lang="en-US" sz="900" b="1" dirty="0"/>
               <a:t>Twilight</a:t>
             </a:r>
-            <a:endParaRPr lang="en-US" sz="900" b="1" dirty="0"/>
           </a:p>
         </p:txBody>
       </p:sp>
@@ -30104,7 +30205,6 @@
               <a:rPr lang="en-US" sz="900" b="1" dirty="0"/>
               <a:t>Big</a:t>
             </a:r>
-            <a:endParaRPr lang="en-US" sz="900" b="1" dirty="0"/>
           </a:p>
         </p:txBody>
       </p:sp>
@@ -30354,7 +30454,6 @@
               <a:rPr lang="en-US" sz="900" b="1" dirty="0"/>
               <a:t>Larry Crowne</a:t>
             </a:r>
-            <a:endParaRPr lang="en-US" sz="900" b="1" dirty="0"/>
           </a:p>
         </p:txBody>
       </p:sp>
@@ -30412,7 +30511,6 @@
               <a:rPr lang="en-US" sz="900" dirty="0"/>
               <a:t>See you later.</a:t>
             </a:r>
-            <a:endParaRPr lang="en-US" sz="900" dirty="0"/>
           </a:p>
         </p:txBody>
       </p:sp>

</xml_diff>